<commit_message>
added slides to ppt
</commit_message>
<xml_diff>
--- a/ProjectReview-2 (1).pptx
+++ b/ProjectReview-2 (1).pptx
@@ -5,7 +5,7 @@
     <p:sldMasterId id="2147483702" r:id="rId1"/>
   </p:sldMasterIdLst>
   <p:notesMasterIdLst>
-    <p:notesMasterId r:id="rId45"/>
+    <p:notesMasterId r:id="rId47"/>
   </p:notesMasterIdLst>
   <p:sldIdLst>
     <p:sldId id="256" r:id="rId2"/>
@@ -34,23 +34,25 @@
     <p:sldId id="300" r:id="rId25"/>
     <p:sldId id="277" r:id="rId26"/>
     <p:sldId id="305" r:id="rId27"/>
-    <p:sldId id="304" r:id="rId28"/>
-    <p:sldId id="301" r:id="rId29"/>
-    <p:sldId id="302" r:id="rId30"/>
-    <p:sldId id="306" r:id="rId31"/>
-    <p:sldId id="307" r:id="rId32"/>
-    <p:sldId id="257" r:id="rId33"/>
-    <p:sldId id="270" r:id="rId34"/>
-    <p:sldId id="281" r:id="rId35"/>
-    <p:sldId id="280" r:id="rId36"/>
-    <p:sldId id="271" r:id="rId37"/>
-    <p:sldId id="264" r:id="rId38"/>
-    <p:sldId id="265" r:id="rId39"/>
-    <p:sldId id="266" r:id="rId40"/>
-    <p:sldId id="272" r:id="rId41"/>
-    <p:sldId id="274" r:id="rId42"/>
-    <p:sldId id="278" r:id="rId43"/>
-    <p:sldId id="268" r:id="rId44"/>
+    <p:sldId id="308" r:id="rId28"/>
+    <p:sldId id="304" r:id="rId29"/>
+    <p:sldId id="266" r:id="rId30"/>
+    <p:sldId id="301" r:id="rId31"/>
+    <p:sldId id="302" r:id="rId32"/>
+    <p:sldId id="306" r:id="rId33"/>
+    <p:sldId id="307" r:id="rId34"/>
+    <p:sldId id="309" r:id="rId35"/>
+    <p:sldId id="257" r:id="rId36"/>
+    <p:sldId id="270" r:id="rId37"/>
+    <p:sldId id="281" r:id="rId38"/>
+    <p:sldId id="280" r:id="rId39"/>
+    <p:sldId id="271" r:id="rId40"/>
+    <p:sldId id="264" r:id="rId41"/>
+    <p:sldId id="265" r:id="rId42"/>
+    <p:sldId id="272" r:id="rId43"/>
+    <p:sldId id="274" r:id="rId44"/>
+    <p:sldId id="278" r:id="rId45"/>
+    <p:sldId id="268" r:id="rId46"/>
   </p:sldIdLst>
   <p:sldSz cx="12192000" cy="6858000"/>
   <p:notesSz cx="6858000" cy="9144000"/>
@@ -239,7 +241,7 @@
           <a:p>
             <a:fld id="{E2C6AAEB-6988-43D2-9654-EC3C0BFABB9D}" type="datetimeFigureOut">
               <a:rPr lang="en-IN" smtClean="0"/>
-              <a:t>31-01-2023</a:t>
+              <a:t>01-02-2023</a:t>
             </a:fld>
             <a:endParaRPr lang="en-IN"/>
           </a:p>
@@ -910,7 +912,7 @@
           <a:p>
             <a:fld id="{0D3A107C-E2A5-4917-B22D-A9F2DBD463CC}" type="datetimeFigureOut">
               <a:rPr lang="en-IN" smtClean="0"/>
-              <a:t>31-01-2023</a:t>
+              <a:t>01-02-2023</a:t>
             </a:fld>
             <a:endParaRPr lang="en-IN"/>
           </a:p>
@@ -1101,7 +1103,7 @@
           <a:p>
             <a:fld id="{0D3A107C-E2A5-4917-B22D-A9F2DBD463CC}" type="datetimeFigureOut">
               <a:rPr lang="en-IN" smtClean="0"/>
-              <a:t>31-01-2023</a:t>
+              <a:t>01-02-2023</a:t>
             </a:fld>
             <a:endParaRPr lang="en-IN"/>
           </a:p>
@@ -1293,7 +1295,7 @@
           <a:p>
             <a:fld id="{0D3A107C-E2A5-4917-B22D-A9F2DBD463CC}" type="datetimeFigureOut">
               <a:rPr lang="en-IN" smtClean="0"/>
-              <a:t>31-01-2023</a:t>
+              <a:t>01-02-2023</a:t>
             </a:fld>
             <a:endParaRPr lang="en-IN"/>
           </a:p>
@@ -1475,7 +1477,7 @@
           <a:p>
             <a:fld id="{0D3A107C-E2A5-4917-B22D-A9F2DBD463CC}" type="datetimeFigureOut">
               <a:rPr lang="en-IN" smtClean="0"/>
-              <a:t>31-01-2023</a:t>
+              <a:t>01-02-2023</a:t>
             </a:fld>
             <a:endParaRPr lang="en-IN"/>
           </a:p>
@@ -1800,7 +1802,7 @@
           <a:p>
             <a:fld id="{0D3A107C-E2A5-4917-B22D-A9F2DBD463CC}" type="datetimeFigureOut">
               <a:rPr lang="en-IN" smtClean="0"/>
-              <a:t>31-01-2023</a:t>
+              <a:t>01-02-2023</a:t>
             </a:fld>
             <a:endParaRPr lang="en-IN"/>
           </a:p>
@@ -2198,7 +2200,7 @@
           <a:p>
             <a:fld id="{0D3A107C-E2A5-4917-B22D-A9F2DBD463CC}" type="datetimeFigureOut">
               <a:rPr lang="en-IN" smtClean="0"/>
-              <a:t>31-01-2023</a:t>
+              <a:t>01-02-2023</a:t>
             </a:fld>
             <a:endParaRPr lang="en-IN"/>
           </a:p>
@@ -2644,7 +2646,7 @@
           <a:p>
             <a:fld id="{0D3A107C-E2A5-4917-B22D-A9F2DBD463CC}" type="datetimeFigureOut">
               <a:rPr lang="en-IN" smtClean="0"/>
-              <a:t>31-01-2023</a:t>
+              <a:t>01-02-2023</a:t>
             </a:fld>
             <a:endParaRPr lang="en-IN"/>
           </a:p>
@@ -2774,7 +2776,7 @@
           <a:p>
             <a:fld id="{0D3A107C-E2A5-4917-B22D-A9F2DBD463CC}" type="datetimeFigureOut">
               <a:rPr lang="en-IN" smtClean="0"/>
-              <a:t>31-01-2023</a:t>
+              <a:t>01-02-2023</a:t>
             </a:fld>
             <a:endParaRPr lang="en-IN"/>
           </a:p>
@@ -2881,7 +2883,7 @@
           <a:p>
             <a:fld id="{0D3A107C-E2A5-4917-B22D-A9F2DBD463CC}" type="datetimeFigureOut">
               <a:rPr lang="en-IN" smtClean="0"/>
-              <a:t>31-01-2023</a:t>
+              <a:t>01-02-2023</a:t>
             </a:fld>
             <a:endParaRPr lang="en-IN"/>
           </a:p>
@@ -3243,7 +3245,7 @@
           <a:p>
             <a:fld id="{0D3A107C-E2A5-4917-B22D-A9F2DBD463CC}" type="datetimeFigureOut">
               <a:rPr lang="en-IN" smtClean="0"/>
-              <a:t>31-01-2023</a:t>
+              <a:t>01-02-2023</a:t>
             </a:fld>
             <a:endParaRPr lang="en-IN"/>
           </a:p>
@@ -3680,7 +3682,7 @@
           <a:p>
             <a:fld id="{0D3A107C-E2A5-4917-B22D-A9F2DBD463CC}" type="datetimeFigureOut">
               <a:rPr lang="en-IN" smtClean="0"/>
-              <a:t>31-01-2023</a:t>
+              <a:t>01-02-2023</a:t>
             </a:fld>
             <a:endParaRPr lang="en-IN"/>
           </a:p>
@@ -3973,7 +3975,7 @@
           <a:p>
             <a:fld id="{0D3A107C-E2A5-4917-B22D-A9F2DBD463CC}" type="datetimeFigureOut">
               <a:rPr lang="en-IN" smtClean="0"/>
-              <a:t>31-01-2023</a:t>
+              <a:t>01-02-2023</a:t>
             </a:fld>
             <a:endParaRPr lang="en-IN"/>
           </a:p>
@@ -5271,13 +5273,13 @@
   <p:clrMapOvr>
     <a:masterClrMapping/>
   </p:clrMapOvr>
-  <mc:AlternateContent xmlns:mc="http://schemas.openxmlformats.org/markup-compatibility/2006">
-    <mc:Choice xmlns:p14="http://schemas.microsoft.com/office/powerpoint/2010/main" Requires="p14">
+  <mc:AlternateContent xmlns:mc="http://schemas.openxmlformats.org/markup-compatibility/2006" xmlns:p14="http://schemas.microsoft.com/office/powerpoint/2010/main">
+    <mc:Choice Requires="p14">
       <p:transition spd="med" p14:dur="700">
         <p:fade/>
       </p:transition>
     </mc:Choice>
-    <mc:Fallback>
+    <mc:Fallback xmlns="">
       <p:transition spd="med">
         <p:fade/>
       </p:transition>
@@ -9535,43 +9537,177 @@
             <p:ph idx="1"/>
           </p:nvPr>
         </p:nvSpPr>
-        <p:spPr/>
+        <p:spPr>
+          <a:xfrm>
+            <a:off x="1069848" y="2121408"/>
+            <a:ext cx="4785829" cy="4050792"/>
+          </a:xfrm>
+        </p:spPr>
         <p:txBody>
           <a:bodyPr/>
           <a:lstStyle/>
           <a:p>
             <a:r>
+              <a:rPr lang="en-US" dirty="0"/>
+              <a:t>L</a:t>
+            </a:r>
+            <a:r>
               <a:rPr lang="en-IN" dirty="0" err="1"/>
-              <a:t>Idhar</a:t>
+              <a:t>evel</a:t>
             </a:r>
             <a:r>
               <a:rPr lang="en-IN" dirty="0"/>
-              <a:t> level 0, 1 </a:t>
-            </a:r>
-            <a:r>
-              <a:rPr lang="en-IN" dirty="0" err="1"/>
-              <a:t>dfd</a:t>
-            </a:r>
-            <a:r>
-              <a:rPr lang="en-IN" dirty="0"/>
-              <a:t> </a:t>
-            </a:r>
-            <a:r>
-              <a:rPr lang="en-IN" dirty="0" err="1"/>
-              <a:t>daal</a:t>
-            </a:r>
-            <a:r>
-              <a:rPr lang="en-IN" dirty="0"/>
-              <a:t> </a:t>
-            </a:r>
-            <a:r>
-              <a:rPr lang="en-IN" dirty="0" err="1"/>
-              <a:t>jojo</a:t>
-            </a:r>
-            <a:r>
-              <a:rPr lang="en-IN" dirty="0"/>
-              <a:t> </a:t>
-            </a:r>
+              <a:t> 0 DFD.                                                           </a:t>
+            </a:r>
+          </a:p>
+          <a:p>
+            <a:endParaRPr lang="en-IN" dirty="0"/>
+          </a:p>
+        </p:txBody>
+      </p:sp>
+      <p:pic>
+        <p:nvPicPr>
+          <p:cNvPr id="4" name="Picture 3" descr="Diagram&#10;&#10;Description automatically generated">
+            <a:extLst>
+              <a:ext uri="{FF2B5EF4-FFF2-40B4-BE49-F238E27FC236}">
+                <a16:creationId xmlns:a16="http://schemas.microsoft.com/office/drawing/2014/main" id="{5663BB59-9C05-79AC-2EEC-8856E0227E66}"/>
+              </a:ext>
+            </a:extLst>
+          </p:cNvPr>
+          <p:cNvPicPr>
+            <a:picLocks noChangeAspect="1"/>
+          </p:cNvPicPr>
+          <p:nvPr/>
+        </p:nvPicPr>
+        <p:blipFill rotWithShape="1">
+          <a:blip r:embed="rId2" cstate="print">
+            <a:extLst>
+              <a:ext uri="{28A0092B-C50C-407E-A947-70E740481C1C}">
+                <a14:useLocalDpi xmlns:a14="http://schemas.microsoft.com/office/drawing/2010/main" val="0"/>
+              </a:ext>
+            </a:extLst>
+          </a:blip>
+          <a:srcRect l="2429" t="17574" b="22401"/>
+          <a:stretch/>
+        </p:blipFill>
+        <p:spPr bwMode="auto">
+          <a:xfrm>
+            <a:off x="1173578" y="2751993"/>
+            <a:ext cx="4453499" cy="3298531"/>
+          </a:xfrm>
+          <a:prstGeom prst="rect">
+            <a:avLst/>
+          </a:prstGeom>
+          <a:noFill/>
+          <a:ln>
+            <a:noFill/>
+          </a:ln>
+          <a:extLst>
+            <a:ext uri="{53640926-AAD7-44D8-BBD7-CCE9431645EC}">
+              <a14:shadowObscured xmlns:a14="http://schemas.microsoft.com/office/drawing/2010/main"/>
+            </a:ext>
+          </a:extLst>
+        </p:spPr>
+      </p:pic>
+      <p:sp>
+        <p:nvSpPr>
+          <p:cNvPr id="5" name="TextBox 4">
+            <a:extLst>
+              <a:ext uri="{FF2B5EF4-FFF2-40B4-BE49-F238E27FC236}">
+                <a16:creationId xmlns:a16="http://schemas.microsoft.com/office/drawing/2014/main" id="{80D9FD7C-13A5-4368-1C9E-4D854DFAB2EE}"/>
+              </a:ext>
+            </a:extLst>
+          </p:cNvPr>
+          <p:cNvSpPr txBox="1"/>
+          <p:nvPr/>
+        </p:nvSpPr>
+        <p:spPr>
+          <a:xfrm flipH="1">
+            <a:off x="6710287" y="2479431"/>
+            <a:ext cx="4785829" cy="4247317"/>
+          </a:xfrm>
+          <a:prstGeom prst="rect">
+            <a:avLst/>
+          </a:prstGeom>
+          <a:noFill/>
+        </p:spPr>
+        <p:txBody>
+          <a:bodyPr wrap="square" rtlCol="0">
+            <a:spAutoFit/>
+          </a:bodyPr>
+          <a:lstStyle/>
+          <a:p>
+            <a:r>
+              <a:rPr lang="en-US" dirty="0" err="1"/>
+              <a:t>Entites</a:t>
+            </a:r>
+            <a:r>
+              <a:rPr lang="en-US" dirty="0"/>
+              <a:t> :</a:t>
+            </a:r>
+          </a:p>
+          <a:p>
+            <a:pPr marL="342900" indent="-342900">
+              <a:buFont typeface="+mj-lt"/>
+              <a:buAutoNum type="arabicPeriod"/>
+            </a:pPr>
+            <a:r>
+              <a:rPr lang="en-US" dirty="0"/>
+              <a:t>Vendor</a:t>
+            </a:r>
+          </a:p>
+          <a:p>
+            <a:pPr marL="342900" indent="-342900">
+              <a:buFont typeface="+mj-lt"/>
+              <a:buAutoNum type="arabicPeriod"/>
+            </a:pPr>
+            <a:r>
+              <a:rPr lang="en-US" dirty="0"/>
+              <a:t>Admin </a:t>
+            </a:r>
+          </a:p>
+          <a:p>
+            <a:pPr marL="342900" indent="-342900">
+              <a:buFont typeface="+mj-lt"/>
+              <a:buAutoNum type="arabicPeriod"/>
+            </a:pPr>
+            <a:r>
+              <a:rPr lang="en-US" dirty="0"/>
+              <a:t>Operator.</a:t>
+            </a:r>
+          </a:p>
+          <a:p>
+            <a:endParaRPr lang="en-IN" dirty="0"/>
+          </a:p>
+          <a:p>
+            <a:endParaRPr lang="en-IN" dirty="0"/>
+          </a:p>
+          <a:p>
+            <a:endParaRPr lang="en-IN" dirty="0"/>
+          </a:p>
+          <a:p>
+            <a:endParaRPr lang="en-IN" dirty="0"/>
+          </a:p>
+          <a:p>
+            <a:endParaRPr lang="en-IN" dirty="0"/>
+          </a:p>
+          <a:p>
+            <a:endParaRPr lang="en-IN" dirty="0"/>
+          </a:p>
+          <a:p>
+            <a:endParaRPr lang="en-IN" dirty="0"/>
+          </a:p>
+          <a:p>
+            <a:endParaRPr lang="en-IN" dirty="0"/>
+          </a:p>
+          <a:p>
+            <a:endParaRPr lang="en-IN" dirty="0"/>
+          </a:p>
+          <a:p>
+            <a:endParaRPr lang="en-IN" dirty="0"/>
+          </a:p>
+          <a:p>
+            <a:endParaRPr lang="en-IN" dirty="0"/>
           </a:p>
         </p:txBody>
       </p:sp>
@@ -9622,7 +9758,7 @@
           <p:cNvPr id="2" name="Title 1">
             <a:extLst>
               <a:ext uri="{FF2B5EF4-FFF2-40B4-BE49-F238E27FC236}">
-                <a16:creationId xmlns:a16="http://schemas.microsoft.com/office/drawing/2014/main" id="{CD1F5C31-F099-C1BE-8F49-741EF39B15F3}"/>
+                <a16:creationId xmlns:a16="http://schemas.microsoft.com/office/drawing/2014/main" id="{7945BEA4-E647-31C7-0C6A-C106B42C610F}"/>
               </a:ext>
             </a:extLst>
           </p:cNvPr>
@@ -9633,15 +9769,19 @@
             <p:ph type="title"/>
           </p:nvPr>
         </p:nvSpPr>
-        <p:spPr/>
+        <p:spPr>
+          <a:xfrm>
+            <a:off x="1069848" y="484632"/>
+            <a:ext cx="10058400" cy="781460"/>
+          </a:xfrm>
+        </p:spPr>
         <p:txBody>
-          <a:bodyPr/>
+          <a:bodyPr>
+            <a:normAutofit fontScale="90000"/>
+          </a:bodyPr>
           <a:lstStyle/>
           <a:p>
-            <a:r>
-              <a:rPr lang="en-IN" dirty="0"/>
-              <a:t>Datasets </a:t>
-            </a:r>
+            <a:endParaRPr lang="en-IN" dirty="0"/>
           </a:p>
         </p:txBody>
       </p:sp>
@@ -9650,7 +9790,7 @@
           <p:cNvPr id="3" name="Content Placeholder 2">
             <a:extLst>
               <a:ext uri="{FF2B5EF4-FFF2-40B4-BE49-F238E27FC236}">
-                <a16:creationId xmlns:a16="http://schemas.microsoft.com/office/drawing/2014/main" id="{1A81A6DE-03FF-7884-3487-9B895254D047}"/>
+                <a16:creationId xmlns:a16="http://schemas.microsoft.com/office/drawing/2014/main" id="{285398AF-63C6-3A6C-8C69-49C5ACA064E6}"/>
               </a:ext>
             </a:extLst>
           </p:cNvPr>
@@ -9661,22 +9801,33 @@
             <p:ph idx="1"/>
           </p:nvPr>
         </p:nvSpPr>
-        <p:spPr/>
+        <p:spPr>
+          <a:xfrm>
+            <a:off x="1069848" y="1406769"/>
+            <a:ext cx="10058400" cy="4765431"/>
+          </a:xfrm>
+        </p:spPr>
         <p:txBody>
           <a:bodyPr/>
           <a:lstStyle/>
           <a:p>
             <a:r>
-              <a:rPr lang="en-IN" dirty="0"/>
-              <a:t>Work done on datasets</a:t>
-            </a:r>
+              <a:rPr lang="en-US" dirty="0"/>
+              <a:t>Level 1 DFD</a:t>
+            </a:r>
+          </a:p>
+          <a:p>
+            <a:pPr marL="0" indent="0">
+              <a:buNone/>
+            </a:pPr>
+            <a:endParaRPr lang="en-IN" dirty="0"/>
           </a:p>
         </p:txBody>
       </p:sp>
     </p:spTree>
     <p:extLst>
       <p:ext uri="{BB962C8B-B14F-4D97-AF65-F5344CB8AC3E}">
-        <p14:creationId xmlns:p14="http://schemas.microsoft.com/office/powerpoint/2010/main" val="1867114802"/>
+        <p14:creationId xmlns:p14="http://schemas.microsoft.com/office/powerpoint/2010/main" val="2046741441"/>
       </p:ext>
     </p:extLst>
   </p:cSld>
@@ -9720,7 +9871,7 @@
           <p:cNvPr id="2" name="Title 1">
             <a:extLst>
               <a:ext uri="{FF2B5EF4-FFF2-40B4-BE49-F238E27FC236}">
-                <a16:creationId xmlns:a16="http://schemas.microsoft.com/office/drawing/2014/main" id="{E7B8C438-24E4-B659-300F-A3770992E573}"/>
+                <a16:creationId xmlns:a16="http://schemas.microsoft.com/office/drawing/2014/main" id="{CD1F5C31-F099-C1BE-8F49-741EF39B15F3}"/>
               </a:ext>
             </a:extLst>
           </p:cNvPr>
@@ -9738,7 +9889,7 @@
           <a:p>
             <a:r>
               <a:rPr lang="en-IN" dirty="0"/>
-              <a:t>Software &amp; hardware requirements.</a:t>
+              <a:t>Datasets </a:t>
             </a:r>
           </a:p>
         </p:txBody>
@@ -9748,7 +9899,7 @@
           <p:cNvPr id="3" name="Content Placeholder 2">
             <a:extLst>
               <a:ext uri="{FF2B5EF4-FFF2-40B4-BE49-F238E27FC236}">
-                <a16:creationId xmlns:a16="http://schemas.microsoft.com/office/drawing/2014/main" id="{2A9FF396-4D9E-9D4B-409A-EDC6CA1C96CD}"/>
+                <a16:creationId xmlns:a16="http://schemas.microsoft.com/office/drawing/2014/main" id="{1A81A6DE-03FF-7884-3487-9B895254D047}"/>
               </a:ext>
             </a:extLst>
           </p:cNvPr>
@@ -9759,7 +9910,12 @@
             <p:ph idx="1"/>
           </p:nvPr>
         </p:nvSpPr>
-        <p:spPr/>
+        <p:spPr>
+          <a:xfrm>
+            <a:off x="1069848" y="2121408"/>
+            <a:ext cx="5726606" cy="4050792"/>
+          </a:xfrm>
+        </p:spPr>
         <p:txBody>
           <a:bodyPr/>
           <a:lstStyle/>
@@ -9769,89 +9925,94 @@
             </a:pPr>
             <a:r>
               <a:rPr lang="en-IN" dirty="0"/>
-              <a:t>Software: </a:t>
-            </a:r>
-          </a:p>
-          <a:p>
-            <a:pPr marL="457200" indent="-457200">
-              <a:buFont typeface="+mj-lt"/>
-              <a:buAutoNum type="arabicPeriod"/>
-            </a:pPr>
-            <a:r>
-              <a:rPr lang="en-US" dirty="0"/>
-              <a:t>Windows:</a:t>
-            </a:r>
-          </a:p>
-          <a:p>
-            <a:pPr marL="457200" indent="-457200">
-              <a:buFont typeface="+mj-lt"/>
-              <a:buAutoNum type="arabicPeriod"/>
-            </a:pPr>
-            <a:r>
-              <a:rPr lang="en-US" dirty="0"/>
-              <a:t>Microsoft® Windows® 7/8/10 (64-bit)</a:t>
-            </a:r>
-          </a:p>
-          <a:p>
-            <a:pPr marL="457200" indent="-457200">
-              <a:buFont typeface="+mj-lt"/>
-              <a:buAutoNum type="arabicPeriod"/>
-            </a:pPr>
-            <a:r>
-              <a:rPr lang="en-US" dirty="0"/>
-              <a:t>Android studio.</a:t>
-            </a:r>
-          </a:p>
-          <a:p>
-            <a:pPr marL="457200" indent="-457200">
-              <a:buFont typeface="+mj-lt"/>
-              <a:buAutoNum type="arabicPeriod"/>
-            </a:pPr>
-            <a:r>
-              <a:rPr lang="en-US" dirty="0"/>
-              <a:t>Visual studio code.</a:t>
-            </a:r>
-          </a:p>
-          <a:p>
-            <a:pPr marL="457200" indent="-457200">
-              <a:buFont typeface="+mj-lt"/>
-              <a:buAutoNum type="arabicPeriod"/>
-            </a:pPr>
-            <a:r>
-              <a:rPr lang="en-US" dirty="0" err="1"/>
-              <a:t>Xammp</a:t>
-            </a:r>
-            <a:r>
-              <a:rPr lang="en-US" dirty="0"/>
-              <a:t>. </a:t>
-            </a:r>
+              <a:t>Work done on datasets.</a:t>
+            </a:r>
+          </a:p>
+          <a:p>
+            <a:r>
+              <a:rPr lang="en-IN" dirty="0"/>
+              <a:t>Dataset taken from -</a:t>
+            </a:r>
+            <a:r>
+              <a:rPr lang="en-US" sz="2000" u="sng" dirty="0">
+                <a:solidFill>
+                  <a:srgbClr val="0000FF"/>
+                </a:solidFill>
+                <a:effectLst/>
+                <a:latin typeface="Times New Roman" panose="02020603050405020304" pitchFamily="18" charset="0"/>
+                <a:ea typeface="Calibri" panose="020F0502020204030204" pitchFamily="34" charset="0"/>
+                <a:cs typeface="Times New Roman" panose="02020603050405020304" pitchFamily="18" charset="0"/>
+                <a:hlinkClick r:id="rId2"/>
+              </a:rPr>
+              <a:t>https://power.larc.nasa.gov/data-access-viewer/</a:t>
+            </a:r>
+            <a:r>
+              <a:rPr lang="en-US" sz="2000" dirty="0">
+                <a:effectLst/>
+                <a:latin typeface="Times New Roman" panose="02020603050405020304" pitchFamily="18" charset="0"/>
+                <a:ea typeface="Calibri" panose="020F0502020204030204" pitchFamily="34" charset="0"/>
+              </a:rPr>
+              <a:t> website</a:t>
+            </a:r>
+          </a:p>
+          <a:p>
+            <a:r>
+              <a:rPr lang="en-US" dirty="0">
+                <a:latin typeface="Times New Roman" panose="02020603050405020304" pitchFamily="18" charset="0"/>
+              </a:rPr>
+              <a:t>Provides windspeed, temperature. </a:t>
+            </a:r>
+            <a:endParaRPr lang="en-IN" dirty="0"/>
           </a:p>
           <a:p>
             <a:pPr marL="0" indent="0">
               <a:buNone/>
             </a:pPr>
-            <a:r>
-              <a:rPr lang="en-US" dirty="0"/>
-              <a:t>  </a:t>
-            </a:r>
-          </a:p>
-          <a:p>
-            <a:pPr marL="457200" indent="-457200">
-              <a:buFont typeface="+mj-lt"/>
-              <a:buAutoNum type="arabicPeriod"/>
-            </a:pPr>
             <a:endParaRPr lang="en-IN" dirty="0"/>
           </a:p>
-          <a:p>
-            <a:pPr lvl="1"/>
-            <a:endParaRPr lang="en-IN" dirty="0"/>
-          </a:p>
         </p:txBody>
       </p:sp>
+      <p:pic>
+        <p:nvPicPr>
+          <p:cNvPr id="4" name="Picture 3">
+            <a:extLst>
+              <a:ext uri="{FF2B5EF4-FFF2-40B4-BE49-F238E27FC236}">
+                <a16:creationId xmlns:a16="http://schemas.microsoft.com/office/drawing/2014/main" id="{EC55FBC9-FB57-5B3F-6598-B190082B5721}"/>
+              </a:ext>
+            </a:extLst>
+          </p:cNvPr>
+          <p:cNvPicPr>
+            <a:picLocks noChangeAspect="1"/>
+          </p:cNvPicPr>
+          <p:nvPr/>
+        </p:nvPicPr>
+        <p:blipFill rotWithShape="1">
+          <a:blip r:embed="rId3"/>
+          <a:srcRect l="1922" t="28718" r="55001" b="4957"/>
+          <a:stretch/>
+        </p:blipFill>
+        <p:spPr bwMode="auto">
+          <a:xfrm>
+            <a:off x="6884376" y="1499059"/>
+            <a:ext cx="5146577" cy="4874309"/>
+          </a:xfrm>
+          <a:prstGeom prst="rect">
+            <a:avLst/>
+          </a:prstGeom>
+          <a:ln>
+            <a:noFill/>
+          </a:ln>
+          <a:extLst>
+            <a:ext uri="{53640926-AAD7-44D8-BBD7-CCE9431645EC}">
+              <a14:shadowObscured xmlns:a14="http://schemas.microsoft.com/office/drawing/2010/main"/>
+            </a:ext>
+          </a:extLst>
+        </p:spPr>
+      </p:pic>
     </p:spTree>
     <p:extLst>
       <p:ext uri="{BB962C8B-B14F-4D97-AF65-F5344CB8AC3E}">
-        <p14:creationId xmlns:p14="http://schemas.microsoft.com/office/powerpoint/2010/main" val="3930413091"/>
+        <p14:creationId xmlns:p14="http://schemas.microsoft.com/office/powerpoint/2010/main" val="1867114802"/>
       </p:ext>
     </p:extLst>
   </p:cSld>
@@ -9895,7 +10056,7 @@
           <p:cNvPr id="2" name="Title 1">
             <a:extLst>
               <a:ext uri="{FF2B5EF4-FFF2-40B4-BE49-F238E27FC236}">
-                <a16:creationId xmlns:a16="http://schemas.microsoft.com/office/drawing/2014/main" id="{B00620DD-B69A-06F7-9D44-A582DAEB30DA}"/>
+                <a16:creationId xmlns:a16="http://schemas.microsoft.com/office/drawing/2014/main" id="{D4271991-FF89-444B-A4AE-F924423DE3A8}"/>
               </a:ext>
             </a:extLst>
           </p:cNvPr>
@@ -9906,12 +10067,23 @@
             <p:ph type="title"/>
           </p:nvPr>
         </p:nvSpPr>
-        <p:spPr/>
+        <p:spPr>
+          <a:xfrm>
+            <a:off x="1069848" y="484632"/>
+            <a:ext cx="10058400" cy="781460"/>
+          </a:xfrm>
+        </p:spPr>
         <p:txBody>
-          <a:bodyPr/>
+          <a:bodyPr>
+            <a:normAutofit fontScale="90000"/>
+          </a:bodyPr>
           <a:lstStyle/>
           <a:p>
-            <a:endParaRPr lang="en-IN"/>
+            <a:r>
+              <a:rPr lang="en-US" dirty="0"/>
+              <a:t>Datasets</a:t>
+            </a:r>
+            <a:endParaRPr lang="en-IN" dirty="0"/>
           </a:p>
         </p:txBody>
       </p:sp>
@@ -9920,7 +10092,7 @@
           <p:cNvPr id="3" name="Content Placeholder 2">
             <a:extLst>
               <a:ext uri="{FF2B5EF4-FFF2-40B4-BE49-F238E27FC236}">
-                <a16:creationId xmlns:a16="http://schemas.microsoft.com/office/drawing/2014/main" id="{B806EA49-1E88-8F0B-BE40-C03292E67077}"/>
+                <a16:creationId xmlns:a16="http://schemas.microsoft.com/office/drawing/2014/main" id="{18B1C9AC-C79B-FB8D-2F3F-71FCA5BE3CA2}"/>
               </a:ext>
             </a:extLst>
           </p:cNvPr>
@@ -9931,64 +10103,317 @@
             <p:ph idx="1"/>
           </p:nvPr>
         </p:nvSpPr>
-        <p:spPr/>
+        <p:spPr>
+          <a:xfrm>
+            <a:off x="1066800" y="1371600"/>
+            <a:ext cx="10058400" cy="4484077"/>
+          </a:xfrm>
+        </p:spPr>
         <p:txBody>
           <a:bodyPr/>
           <a:lstStyle/>
           <a:p>
-            <a:pPr marL="0" indent="0">
+            <a:r>
+              <a:rPr lang="en-US" dirty="0">
+                <a:latin typeface="Bookman Old Style" panose="02050604050505020204" pitchFamily="18" charset="0"/>
+              </a:rPr>
+              <a:t>Sources:</a:t>
+            </a:r>
+          </a:p>
+          <a:p>
+            <a:pPr lvl="1">
+              <a:lnSpc>
+                <a:spcPct val="150000"/>
+              </a:lnSpc>
+            </a:pPr>
+            <a:r>
+              <a:rPr lang="en-US" b="1" i="0" dirty="0">
+                <a:solidFill>
+                  <a:srgbClr val="202124"/>
+                </a:solidFill>
+                <a:effectLst/>
+                <a:latin typeface="Bookman Old Style" panose="02050604050505020204" pitchFamily="18" charset="0"/>
+              </a:rPr>
+              <a:t>DATASET - Images of mechanical parts (Bolt, Nut, Washer, Pin) </a:t>
+            </a:r>
+            <a:r>
+              <a:rPr lang="en-US" sz="1400" dirty="0">
+                <a:latin typeface="Bookman Old Style" panose="02050604050505020204" pitchFamily="18" charset="0"/>
+                <a:hlinkClick r:id="rId2"/>
+              </a:rPr>
+              <a:t>https://www.kaggle.com/datasets/manikantanrnair/images-of-mechanical-parts-boltnut-washerpin</a:t>
+            </a:r>
+            <a:r>
+              <a:rPr lang="en-US" sz="1400" dirty="0">
+                <a:latin typeface="Bookman Old Style" panose="02050604050505020204" pitchFamily="18" charset="0"/>
+              </a:rPr>
+              <a:t> </a:t>
+            </a:r>
+          </a:p>
+          <a:p>
+            <a:pPr marL="274320" lvl="1" indent="0">
               <a:buNone/>
             </a:pPr>
-            <a:r>
-              <a:rPr lang="en-IN" dirty="0"/>
-              <a:t>Hardware Requirements:</a:t>
-            </a:r>
-          </a:p>
-          <a:p>
-            <a:pPr marL="457200" indent="-457200">
-              <a:buFont typeface="+mj-lt"/>
-              <a:buAutoNum type="arabicPeriod"/>
-            </a:pPr>
-            <a:r>
-              <a:rPr lang="en-IN" dirty="0"/>
-              <a:t>4 GB RAM minimum, 8 GB RAM recommended</a:t>
-            </a:r>
-          </a:p>
-          <a:p>
-            <a:pPr marL="457200" indent="-457200">
-              <a:buFont typeface="+mj-lt"/>
-              <a:buAutoNum type="arabicPeriod"/>
-            </a:pPr>
-            <a:r>
-              <a:rPr lang="en-IN" dirty="0"/>
-              <a:t>2 GB of available disk space minimum,</a:t>
-            </a:r>
-          </a:p>
-          <a:p>
-            <a:pPr marL="457200" indent="-457200">
-              <a:buFont typeface="+mj-lt"/>
-              <a:buAutoNum type="arabicPeriod"/>
-            </a:pPr>
-            <a:r>
-              <a:rPr lang="en-IN" dirty="0"/>
-              <a:t>4 GB Recommended (500 MB for IDE + 1.5 GB for Android SDK and emulator system image)</a:t>
-            </a:r>
-          </a:p>
-          <a:p>
-            <a:pPr marL="457200" indent="-457200">
-              <a:buFont typeface="+mj-lt"/>
-              <a:buAutoNum type="arabicPeriod"/>
-            </a:pPr>
-            <a:r>
-              <a:rPr lang="en-IN" dirty="0"/>
-              <a:t>1280 x 800 minimum screen resolution</a:t>
-            </a:r>
-          </a:p>
-          <a:p>
-            <a:pPr marL="457200" indent="-457200">
-              <a:buFont typeface="+mj-lt"/>
-              <a:buAutoNum type="arabicPeriod"/>
-            </a:pPr>
+            <a:endParaRPr lang="en-US" b="1" dirty="0"/>
+          </a:p>
+        </p:txBody>
+      </p:sp>
+      <p:pic>
+        <p:nvPicPr>
+          <p:cNvPr id="6" name="Picture 5">
+            <a:extLst>
+              <a:ext uri="{FF2B5EF4-FFF2-40B4-BE49-F238E27FC236}">
+                <a16:creationId xmlns:a16="http://schemas.microsoft.com/office/drawing/2014/main" id="{1C4A4CB5-6A1F-C2D1-8D5C-2F4628CAB704}"/>
+              </a:ext>
+            </a:extLst>
+          </p:cNvPr>
+          <p:cNvPicPr>
+            <a:picLocks noChangeAspect="1"/>
+          </p:cNvPicPr>
+          <p:nvPr/>
+        </p:nvPicPr>
+        <p:blipFill rotWithShape="1">
+          <a:blip r:embed="rId3"/>
+          <a:srcRect l="9559" t="16340" r="2647" b="1438"/>
+          <a:stretch/>
+        </p:blipFill>
+        <p:spPr>
+          <a:xfrm>
+            <a:off x="932331" y="2987690"/>
+            <a:ext cx="2841884" cy="1497106"/>
+          </a:xfrm>
+          <a:prstGeom prst="rect">
+            <a:avLst/>
+          </a:prstGeom>
+        </p:spPr>
+      </p:pic>
+      <p:sp>
+        <p:nvSpPr>
+          <p:cNvPr id="7" name="TextBox 6">
+            <a:extLst>
+              <a:ext uri="{FF2B5EF4-FFF2-40B4-BE49-F238E27FC236}">
+                <a16:creationId xmlns:a16="http://schemas.microsoft.com/office/drawing/2014/main" id="{1F8A0EBC-12A4-3F04-93E4-7C5810B80345}"/>
+              </a:ext>
+            </a:extLst>
+          </p:cNvPr>
+          <p:cNvSpPr txBox="1"/>
+          <p:nvPr/>
+        </p:nvSpPr>
+        <p:spPr>
+          <a:xfrm>
+            <a:off x="2008094" y="4616238"/>
+            <a:ext cx="1335741" cy="369332"/>
+          </a:xfrm>
+          <a:prstGeom prst="rect">
+            <a:avLst/>
+          </a:prstGeom>
+          <a:noFill/>
+        </p:spPr>
+        <p:txBody>
+          <a:bodyPr wrap="square" rtlCol="0">
+            <a:spAutoFit/>
+          </a:bodyPr>
+          <a:lstStyle/>
+          <a:p>
+            <a:r>
+              <a:rPr lang="en-US" dirty="0"/>
+              <a:t>Bolts</a:t>
+            </a:r>
+            <a:endParaRPr lang="en-IN" dirty="0"/>
+          </a:p>
+        </p:txBody>
+      </p:sp>
+      <p:pic>
+        <p:nvPicPr>
+          <p:cNvPr id="9" name="Picture 8">
+            <a:extLst>
+              <a:ext uri="{FF2B5EF4-FFF2-40B4-BE49-F238E27FC236}">
+                <a16:creationId xmlns:a16="http://schemas.microsoft.com/office/drawing/2014/main" id="{0136141D-22B4-43B1-8490-119561AAEA0E}"/>
+              </a:ext>
+            </a:extLst>
+          </p:cNvPr>
+          <p:cNvPicPr>
+            <a:picLocks noChangeAspect="1"/>
+          </p:cNvPicPr>
+          <p:nvPr/>
+        </p:nvPicPr>
+        <p:blipFill rotWithShape="1">
+          <a:blip r:embed="rId4"/>
+          <a:srcRect l="9706" t="15949" r="2573" b="1568"/>
+          <a:stretch/>
+        </p:blipFill>
+        <p:spPr>
+          <a:xfrm>
+            <a:off x="4338916" y="3012141"/>
+            <a:ext cx="2830503" cy="1497106"/>
+          </a:xfrm>
+          <a:prstGeom prst="rect">
+            <a:avLst/>
+          </a:prstGeom>
+        </p:spPr>
+      </p:pic>
+      <p:sp>
+        <p:nvSpPr>
+          <p:cNvPr id="10" name="TextBox 9">
+            <a:extLst>
+              <a:ext uri="{FF2B5EF4-FFF2-40B4-BE49-F238E27FC236}">
+                <a16:creationId xmlns:a16="http://schemas.microsoft.com/office/drawing/2014/main" id="{B7650581-4B9A-C3CB-52D2-636683B22540}"/>
+              </a:ext>
+            </a:extLst>
+          </p:cNvPr>
+          <p:cNvSpPr txBox="1"/>
+          <p:nvPr/>
+        </p:nvSpPr>
+        <p:spPr>
+          <a:xfrm>
+            <a:off x="5134431" y="4628464"/>
+            <a:ext cx="1335741" cy="369332"/>
+          </a:xfrm>
+          <a:prstGeom prst="rect">
+            <a:avLst/>
+          </a:prstGeom>
+          <a:noFill/>
+        </p:spPr>
+        <p:txBody>
+          <a:bodyPr wrap="square" rtlCol="0">
+            <a:spAutoFit/>
+          </a:bodyPr>
+          <a:lstStyle/>
+          <a:p>
+            <a:r>
+              <a:rPr lang="en-US" dirty="0"/>
+              <a:t>Washer</a:t>
+            </a:r>
+            <a:endParaRPr lang="en-IN" dirty="0"/>
+          </a:p>
+        </p:txBody>
+      </p:sp>
+      <p:pic>
+        <p:nvPicPr>
+          <p:cNvPr id="12" name="Picture 11">
+            <a:extLst>
+              <a:ext uri="{FF2B5EF4-FFF2-40B4-BE49-F238E27FC236}">
+                <a16:creationId xmlns:a16="http://schemas.microsoft.com/office/drawing/2014/main" id="{3A7EDFC0-4525-1DE3-8779-4706DF83F5DA}"/>
+              </a:ext>
+            </a:extLst>
+          </p:cNvPr>
+          <p:cNvPicPr>
+            <a:picLocks noChangeAspect="1"/>
+          </p:cNvPicPr>
+          <p:nvPr/>
+        </p:nvPicPr>
+        <p:blipFill rotWithShape="1">
+          <a:blip r:embed="rId5"/>
+          <a:srcRect l="9779" t="18462" r="2207" b="1568"/>
+          <a:stretch/>
+        </p:blipFill>
+        <p:spPr>
+          <a:xfrm>
+            <a:off x="7937489" y="2987690"/>
+            <a:ext cx="3003933" cy="1535266"/>
+          </a:xfrm>
+          <a:prstGeom prst="rect">
+            <a:avLst/>
+          </a:prstGeom>
+        </p:spPr>
+      </p:pic>
+      <p:sp>
+        <p:nvSpPr>
+          <p:cNvPr id="13" name="TextBox 12">
+            <a:extLst>
+              <a:ext uri="{FF2B5EF4-FFF2-40B4-BE49-F238E27FC236}">
+                <a16:creationId xmlns:a16="http://schemas.microsoft.com/office/drawing/2014/main" id="{8115098A-45B1-914D-0098-5EF0E87729E6}"/>
+              </a:ext>
+            </a:extLst>
+          </p:cNvPr>
+          <p:cNvSpPr txBox="1"/>
+          <p:nvPr/>
+        </p:nvSpPr>
+        <p:spPr>
+          <a:xfrm>
+            <a:off x="9107762" y="4622175"/>
+            <a:ext cx="1335741" cy="369332"/>
+          </a:xfrm>
+          <a:prstGeom prst="rect">
+            <a:avLst/>
+          </a:prstGeom>
+          <a:noFill/>
+        </p:spPr>
+        <p:txBody>
+          <a:bodyPr wrap="square" rtlCol="0">
+            <a:spAutoFit/>
+          </a:bodyPr>
+          <a:lstStyle/>
+          <a:p>
+            <a:r>
+              <a:rPr lang="en-US" dirty="0"/>
+              <a:t>Nuts</a:t>
+            </a:r>
+            <a:endParaRPr lang="en-IN" dirty="0"/>
+          </a:p>
+        </p:txBody>
+      </p:sp>
+      <p:pic>
+        <p:nvPicPr>
+          <p:cNvPr id="15" name="Picture 14">
+            <a:extLst>
+              <a:ext uri="{FF2B5EF4-FFF2-40B4-BE49-F238E27FC236}">
+                <a16:creationId xmlns:a16="http://schemas.microsoft.com/office/drawing/2014/main" id="{8413B6EF-9FAA-876A-61BC-06C2CDF4947B}"/>
+              </a:ext>
+            </a:extLst>
+          </p:cNvPr>
+          <p:cNvPicPr>
+            <a:picLocks noChangeAspect="1"/>
+          </p:cNvPicPr>
+          <p:nvPr/>
+        </p:nvPicPr>
+        <p:blipFill rotWithShape="1">
+          <a:blip r:embed="rId6"/>
+          <a:srcRect l="10367" t="18462" r="3309" b="1961"/>
+          <a:stretch/>
+        </p:blipFill>
+        <p:spPr>
+          <a:xfrm>
+            <a:off x="2268071" y="5200226"/>
+            <a:ext cx="2528047" cy="1310901"/>
+          </a:xfrm>
+          <a:prstGeom prst="rect">
+            <a:avLst/>
+          </a:prstGeom>
+        </p:spPr>
+      </p:pic>
+      <p:sp>
+        <p:nvSpPr>
+          <p:cNvPr id="16" name="TextBox 15">
+            <a:extLst>
+              <a:ext uri="{FF2B5EF4-FFF2-40B4-BE49-F238E27FC236}">
+                <a16:creationId xmlns:a16="http://schemas.microsoft.com/office/drawing/2014/main" id="{01EC4948-8C22-230C-CF91-472F18695CF3}"/>
+              </a:ext>
+            </a:extLst>
+          </p:cNvPr>
+          <p:cNvSpPr txBox="1"/>
+          <p:nvPr/>
+        </p:nvSpPr>
+        <p:spPr>
+          <a:xfrm>
+            <a:off x="5134431" y="5756523"/>
+            <a:ext cx="1821424" cy="369332"/>
+          </a:xfrm>
+          <a:prstGeom prst="rect">
+            <a:avLst/>
+          </a:prstGeom>
+          <a:noFill/>
+        </p:spPr>
+        <p:txBody>
+          <a:bodyPr wrap="square" rtlCol="0">
+            <a:spAutoFit/>
+          </a:bodyPr>
+          <a:lstStyle/>
+          <a:p>
+            <a:r>
+              <a:rPr lang="en-US" dirty="0"/>
+              <a:t>Locating Pin</a:t>
+            </a:r>
             <a:endParaRPr lang="en-IN" dirty="0"/>
           </a:p>
         </p:txBody>
@@ -9996,7 +10421,7 @@
     </p:spTree>
     <p:extLst>
       <p:ext uri="{BB962C8B-B14F-4D97-AF65-F5344CB8AC3E}">
-        <p14:creationId xmlns:p14="http://schemas.microsoft.com/office/powerpoint/2010/main" val="3034760654"/>
+        <p14:creationId xmlns:p14="http://schemas.microsoft.com/office/powerpoint/2010/main" val="667155574"/>
       </p:ext>
     </p:extLst>
   </p:cSld>
@@ -10080,15 +10505,112 @@
             <p:ph idx="1"/>
           </p:nvPr>
         </p:nvSpPr>
-        <p:spPr/>
+        <p:spPr>
+          <a:xfrm>
+            <a:off x="465991" y="2121408"/>
+            <a:ext cx="7376747" cy="4050792"/>
+          </a:xfrm>
+        </p:spPr>
         <p:txBody>
-          <a:bodyPr/>
+          <a:bodyPr>
+            <a:normAutofit/>
+          </a:bodyPr>
           <a:lstStyle/>
           <a:p>
-            <a:endParaRPr lang="en-IN" dirty="0"/>
+            <a:r>
+              <a:rPr lang="en-US" dirty="0" err="1"/>
+              <a:t>Anemos</a:t>
+            </a:r>
+            <a:r>
+              <a:rPr lang="en-US" dirty="0"/>
+              <a:t> Energies Pvt Ltd (AEPL) founded in 2016.</a:t>
+            </a:r>
+          </a:p>
+          <a:p>
+            <a:r>
+              <a:rPr lang="en-US" dirty="0"/>
+              <a:t>Strong wind energy fundamentals, sophisticated technology, precise manufacturing, and stringent quality controls</a:t>
+            </a:r>
+          </a:p>
+          <a:p>
+            <a:r>
+              <a:rPr lang="en-US" dirty="0"/>
+              <a:t>Delivers powerful and aggressively priced wind energy solution</a:t>
+            </a:r>
+          </a:p>
+          <a:p>
+            <a:r>
+              <a:rPr lang="en-US" dirty="0"/>
+              <a:t>Global team with European and Asian members. </a:t>
+            </a:r>
+          </a:p>
+          <a:p>
+            <a:r>
+              <a:rPr lang="en-US" dirty="0"/>
+              <a:t>Research team in China for over a decade for cost-effective testing</a:t>
+            </a:r>
+          </a:p>
+          <a:p>
+            <a:r>
+              <a:rPr lang="en-US" dirty="0"/>
+              <a:t>Diverse team provides edge in delivering high-tech wind turbine at affordable price point</a:t>
+            </a:r>
+          </a:p>
+          <a:p>
+            <a:r>
+              <a:rPr lang="en-US" dirty="0"/>
+              <a:t>Goal: make clean renewable energy universally accessible.</a:t>
+            </a:r>
           </a:p>
         </p:txBody>
       </p:sp>
+      <p:pic>
+        <p:nvPicPr>
+          <p:cNvPr id="4" name="Picture 2" descr="C:\Users\FIRE FIST ACE\Downloads\edited-01-min-1400x500.jpg">
+            <a:extLst>
+              <a:ext uri="{FF2B5EF4-FFF2-40B4-BE49-F238E27FC236}">
+                <a16:creationId xmlns:a16="http://schemas.microsoft.com/office/drawing/2014/main" id="{1DF36FE7-42D5-53D7-31E6-555421481C3E}"/>
+              </a:ext>
+            </a:extLst>
+          </p:cNvPr>
+          <p:cNvPicPr>
+            <a:picLocks noChangeAspect="1" noChangeArrowheads="1"/>
+          </p:cNvPicPr>
+          <p:nvPr/>
+        </p:nvPicPr>
+        <p:blipFill>
+          <a:blip r:embed="rId2">
+            <a:extLst>
+              <a:ext uri="{28A0092B-C50C-407E-A947-70E740481C1C}">
+                <a14:useLocalDpi xmlns:a14="http://schemas.microsoft.com/office/drawing/2010/main" val="0"/>
+              </a:ext>
+            </a:extLst>
+          </a:blip>
+          <a:srcRect/>
+          <a:stretch>
+            <a:fillRect/>
+          </a:stretch>
+        </p:blipFill>
+        <p:spPr bwMode="auto">
+          <a:xfrm>
+            <a:off x="7614138" y="2699239"/>
+            <a:ext cx="4317024" cy="2064786"/>
+          </a:xfrm>
+          <a:prstGeom prst="rect">
+            <a:avLst/>
+          </a:prstGeom>
+          <a:noFill/>
+          <a:extLst>
+            <a:ext uri="{909E8E84-426E-40DD-AFC4-6F175D3DCCD1}">
+              <a14:hiddenFill xmlns:a14="http://schemas.microsoft.com/office/drawing/2010/main">
+                <a:solidFill>
+                  <a:srgbClr val="FFFFFF"/>
+                </a:solidFill>
+              </a14:hiddenFill>
+            </a:ext>
+          </a:extLst>
+        </p:spPr>
+      </p:pic>
     </p:spTree>
     <p:extLst>
       <p:ext uri="{BB962C8B-B14F-4D97-AF65-F5344CB8AC3E}">
@@ -10115,6 +10637,326 @@
 </file>
 
 <file path=ppt/slides/slide30.xml><?xml version="1.0" encoding="utf-8"?>
+<p:sld xmlns:a="http://schemas.openxmlformats.org/drawingml/2006/main" xmlns:r="http://schemas.openxmlformats.org/officeDocument/2006/relationships" xmlns:p="http://schemas.openxmlformats.org/presentationml/2006/main">
+  <p:cSld>
+    <p:spTree>
+      <p:nvGrpSpPr>
+        <p:cNvPr id="1" name=""/>
+        <p:cNvGrpSpPr/>
+        <p:nvPr/>
+      </p:nvGrpSpPr>
+      <p:grpSpPr>
+        <a:xfrm>
+          <a:off x="0" y="0"/>
+          <a:ext cx="0" cy="0"/>
+          <a:chOff x="0" y="0"/>
+          <a:chExt cx="0" cy="0"/>
+        </a:xfrm>
+      </p:grpSpPr>
+      <p:sp>
+        <p:nvSpPr>
+          <p:cNvPr id="2" name="Title 1">
+            <a:extLst>
+              <a:ext uri="{FF2B5EF4-FFF2-40B4-BE49-F238E27FC236}">
+                <a16:creationId xmlns:a16="http://schemas.microsoft.com/office/drawing/2014/main" id="{E7B8C438-24E4-B659-300F-A3770992E573}"/>
+              </a:ext>
+            </a:extLst>
+          </p:cNvPr>
+          <p:cNvSpPr>
+            <a:spLocks noGrp="1"/>
+          </p:cNvSpPr>
+          <p:nvPr>
+            <p:ph type="title"/>
+          </p:nvPr>
+        </p:nvSpPr>
+        <p:spPr/>
+        <p:txBody>
+          <a:bodyPr/>
+          <a:lstStyle/>
+          <a:p>
+            <a:r>
+              <a:rPr lang="en-IN" dirty="0"/>
+              <a:t>Software &amp; hardware requirements.</a:t>
+            </a:r>
+          </a:p>
+        </p:txBody>
+      </p:sp>
+      <p:sp>
+        <p:nvSpPr>
+          <p:cNvPr id="3" name="Content Placeholder 2">
+            <a:extLst>
+              <a:ext uri="{FF2B5EF4-FFF2-40B4-BE49-F238E27FC236}">
+                <a16:creationId xmlns:a16="http://schemas.microsoft.com/office/drawing/2014/main" id="{2A9FF396-4D9E-9D4B-409A-EDC6CA1C96CD}"/>
+              </a:ext>
+            </a:extLst>
+          </p:cNvPr>
+          <p:cNvSpPr>
+            <a:spLocks noGrp="1"/>
+          </p:cNvSpPr>
+          <p:nvPr>
+            <p:ph idx="1"/>
+          </p:nvPr>
+        </p:nvSpPr>
+        <p:spPr/>
+        <p:txBody>
+          <a:bodyPr/>
+          <a:lstStyle/>
+          <a:p>
+            <a:pPr marL="0" indent="0">
+              <a:buNone/>
+            </a:pPr>
+            <a:r>
+              <a:rPr lang="en-IN" dirty="0"/>
+              <a:t>Software: </a:t>
+            </a:r>
+          </a:p>
+          <a:p>
+            <a:pPr marL="457200" indent="-457200">
+              <a:buFont typeface="+mj-lt"/>
+              <a:buAutoNum type="arabicPeriod"/>
+            </a:pPr>
+            <a:r>
+              <a:rPr lang="en-US" dirty="0"/>
+              <a:t>Windows:</a:t>
+            </a:r>
+          </a:p>
+          <a:p>
+            <a:pPr marL="457200" indent="-457200">
+              <a:buFont typeface="+mj-lt"/>
+              <a:buAutoNum type="arabicPeriod"/>
+            </a:pPr>
+            <a:r>
+              <a:rPr lang="en-US" dirty="0"/>
+              <a:t>Microsoft® Windows® 7/8/10 (64-bit)</a:t>
+            </a:r>
+          </a:p>
+          <a:p>
+            <a:pPr marL="457200" indent="-457200">
+              <a:buFont typeface="+mj-lt"/>
+              <a:buAutoNum type="arabicPeriod"/>
+            </a:pPr>
+            <a:r>
+              <a:rPr lang="en-US" dirty="0"/>
+              <a:t>Android studio.</a:t>
+            </a:r>
+          </a:p>
+          <a:p>
+            <a:pPr marL="457200" indent="-457200">
+              <a:buFont typeface="+mj-lt"/>
+              <a:buAutoNum type="arabicPeriod"/>
+            </a:pPr>
+            <a:r>
+              <a:rPr lang="en-US" dirty="0"/>
+              <a:t>Visual studio code.</a:t>
+            </a:r>
+          </a:p>
+          <a:p>
+            <a:pPr marL="457200" indent="-457200">
+              <a:buFont typeface="+mj-lt"/>
+              <a:buAutoNum type="arabicPeriod"/>
+            </a:pPr>
+            <a:r>
+              <a:rPr lang="en-US" dirty="0" err="1"/>
+              <a:t>Xammp</a:t>
+            </a:r>
+            <a:r>
+              <a:rPr lang="en-US" dirty="0"/>
+              <a:t>. </a:t>
+            </a:r>
+          </a:p>
+          <a:p>
+            <a:pPr marL="0" indent="0">
+              <a:buNone/>
+            </a:pPr>
+            <a:r>
+              <a:rPr lang="en-US" dirty="0"/>
+              <a:t>  </a:t>
+            </a:r>
+          </a:p>
+          <a:p>
+            <a:pPr marL="457200" indent="-457200">
+              <a:buFont typeface="+mj-lt"/>
+              <a:buAutoNum type="arabicPeriod"/>
+            </a:pPr>
+            <a:endParaRPr lang="en-IN" dirty="0"/>
+          </a:p>
+          <a:p>
+            <a:pPr lvl="1"/>
+            <a:endParaRPr lang="en-IN" dirty="0"/>
+          </a:p>
+        </p:txBody>
+      </p:sp>
+    </p:spTree>
+    <p:extLst>
+      <p:ext uri="{BB962C8B-B14F-4D97-AF65-F5344CB8AC3E}">
+        <p14:creationId xmlns:p14="http://schemas.microsoft.com/office/powerpoint/2010/main" val="3930413091"/>
+      </p:ext>
+    </p:extLst>
+  </p:cSld>
+  <p:clrMapOvr>
+    <a:masterClrMapping/>
+  </p:clrMapOvr>
+  <mc:AlternateContent xmlns:mc="http://schemas.openxmlformats.org/markup-compatibility/2006" xmlns:p14="http://schemas.microsoft.com/office/powerpoint/2010/main">
+    <mc:Choice Requires="p14">
+      <p:transition spd="med" p14:dur="700">
+        <p:fade/>
+      </p:transition>
+    </mc:Choice>
+    <mc:Fallback xmlns="">
+      <p:transition spd="med">
+        <p:fade/>
+      </p:transition>
+    </mc:Fallback>
+  </mc:AlternateContent>
+</p:sld>
+</file>
+
+<file path=ppt/slides/slide31.xml><?xml version="1.0" encoding="utf-8"?>
+<p:sld xmlns:a="http://schemas.openxmlformats.org/drawingml/2006/main" xmlns:r="http://schemas.openxmlformats.org/officeDocument/2006/relationships" xmlns:p="http://schemas.openxmlformats.org/presentationml/2006/main">
+  <p:cSld>
+    <p:spTree>
+      <p:nvGrpSpPr>
+        <p:cNvPr id="1" name=""/>
+        <p:cNvGrpSpPr/>
+        <p:nvPr/>
+      </p:nvGrpSpPr>
+      <p:grpSpPr>
+        <a:xfrm>
+          <a:off x="0" y="0"/>
+          <a:ext cx="0" cy="0"/>
+          <a:chOff x="0" y="0"/>
+          <a:chExt cx="0" cy="0"/>
+        </a:xfrm>
+      </p:grpSpPr>
+      <p:sp>
+        <p:nvSpPr>
+          <p:cNvPr id="2" name="Title 1">
+            <a:extLst>
+              <a:ext uri="{FF2B5EF4-FFF2-40B4-BE49-F238E27FC236}">
+                <a16:creationId xmlns:a16="http://schemas.microsoft.com/office/drawing/2014/main" id="{B00620DD-B69A-06F7-9D44-A582DAEB30DA}"/>
+              </a:ext>
+            </a:extLst>
+          </p:cNvPr>
+          <p:cNvSpPr>
+            <a:spLocks noGrp="1"/>
+          </p:cNvSpPr>
+          <p:nvPr>
+            <p:ph type="title"/>
+          </p:nvPr>
+        </p:nvSpPr>
+        <p:spPr/>
+        <p:txBody>
+          <a:bodyPr/>
+          <a:lstStyle/>
+          <a:p>
+            <a:endParaRPr lang="en-IN"/>
+          </a:p>
+        </p:txBody>
+      </p:sp>
+      <p:sp>
+        <p:nvSpPr>
+          <p:cNvPr id="3" name="Content Placeholder 2">
+            <a:extLst>
+              <a:ext uri="{FF2B5EF4-FFF2-40B4-BE49-F238E27FC236}">
+                <a16:creationId xmlns:a16="http://schemas.microsoft.com/office/drawing/2014/main" id="{B806EA49-1E88-8F0B-BE40-C03292E67077}"/>
+              </a:ext>
+            </a:extLst>
+          </p:cNvPr>
+          <p:cNvSpPr>
+            <a:spLocks noGrp="1"/>
+          </p:cNvSpPr>
+          <p:nvPr>
+            <p:ph idx="1"/>
+          </p:nvPr>
+        </p:nvSpPr>
+        <p:spPr/>
+        <p:txBody>
+          <a:bodyPr/>
+          <a:lstStyle/>
+          <a:p>
+            <a:pPr marL="0" indent="0">
+              <a:buNone/>
+            </a:pPr>
+            <a:r>
+              <a:rPr lang="en-IN" dirty="0"/>
+              <a:t>Hardware Requirements:</a:t>
+            </a:r>
+          </a:p>
+          <a:p>
+            <a:pPr marL="457200" indent="-457200">
+              <a:buFont typeface="+mj-lt"/>
+              <a:buAutoNum type="arabicPeriod"/>
+            </a:pPr>
+            <a:r>
+              <a:rPr lang="en-IN" dirty="0"/>
+              <a:t>4 GB RAM minimum, 8 GB RAM recommended</a:t>
+            </a:r>
+          </a:p>
+          <a:p>
+            <a:pPr marL="457200" indent="-457200">
+              <a:buFont typeface="+mj-lt"/>
+              <a:buAutoNum type="arabicPeriod"/>
+            </a:pPr>
+            <a:r>
+              <a:rPr lang="en-IN" dirty="0"/>
+              <a:t>2 GB of available disk space minimum,</a:t>
+            </a:r>
+          </a:p>
+          <a:p>
+            <a:pPr marL="457200" indent="-457200">
+              <a:buFont typeface="+mj-lt"/>
+              <a:buAutoNum type="arabicPeriod"/>
+            </a:pPr>
+            <a:r>
+              <a:rPr lang="en-IN" dirty="0"/>
+              <a:t>4 GB Recommended (500 MB for IDE + 1.5 GB for Android SDK and emulator system image)</a:t>
+            </a:r>
+          </a:p>
+          <a:p>
+            <a:pPr marL="457200" indent="-457200">
+              <a:buFont typeface="+mj-lt"/>
+              <a:buAutoNum type="arabicPeriod"/>
+            </a:pPr>
+            <a:r>
+              <a:rPr lang="en-IN" dirty="0"/>
+              <a:t>1280 x 800 minimum screen resolution</a:t>
+            </a:r>
+          </a:p>
+          <a:p>
+            <a:pPr marL="457200" indent="-457200">
+              <a:buFont typeface="+mj-lt"/>
+              <a:buAutoNum type="arabicPeriod"/>
+            </a:pPr>
+            <a:endParaRPr lang="en-IN" dirty="0"/>
+          </a:p>
+        </p:txBody>
+      </p:sp>
+    </p:spTree>
+    <p:extLst>
+      <p:ext uri="{BB962C8B-B14F-4D97-AF65-F5344CB8AC3E}">
+        <p14:creationId xmlns:p14="http://schemas.microsoft.com/office/powerpoint/2010/main" val="3034760654"/>
+      </p:ext>
+    </p:extLst>
+  </p:cSld>
+  <p:clrMapOvr>
+    <a:masterClrMapping/>
+  </p:clrMapOvr>
+  <mc:AlternateContent xmlns:mc="http://schemas.openxmlformats.org/markup-compatibility/2006" xmlns:p14="http://schemas.microsoft.com/office/powerpoint/2010/main">
+    <mc:Choice Requires="p14">
+      <p:transition spd="med" p14:dur="700">
+        <p:fade/>
+      </p:transition>
+    </mc:Choice>
+    <mc:Fallback xmlns="">
+      <p:transition spd="med">
+        <p:fade/>
+      </p:transition>
+    </mc:Fallback>
+  </mc:AlternateContent>
+</p:sld>
+</file>
+
+<file path=ppt/slides/slide32.xml><?xml version="1.0" encoding="utf-8"?>
 <p:sld xmlns:a="http://schemas.openxmlformats.org/drawingml/2006/main" xmlns:r="http://schemas.openxmlformats.org/officeDocument/2006/relationships" xmlns:p="http://schemas.openxmlformats.org/presentationml/2006/main">
   <p:cSld>
     <p:spTree>
@@ -10315,7 +11157,7 @@
 </p:sld>
 </file>
 
-<file path=ppt/slides/slide31.xml><?xml version="1.0" encoding="utf-8"?>
+<file path=ppt/slides/slide33.xml><?xml version="1.0" encoding="utf-8"?>
 <p:sld xmlns:a="http://schemas.openxmlformats.org/drawingml/2006/main" xmlns:r="http://schemas.openxmlformats.org/officeDocument/2006/relationships" xmlns:p="http://schemas.openxmlformats.org/presentationml/2006/main">
   <p:cSld>
     <p:spTree>
@@ -10534,7 +11376,103 @@
 </p:sld>
 </file>
 
-<file path=ppt/slides/slide32.xml><?xml version="1.0" encoding="utf-8"?>
+<file path=ppt/slides/slide34.xml><?xml version="1.0" encoding="utf-8"?>
+<p:sld xmlns:a="http://schemas.openxmlformats.org/drawingml/2006/main" xmlns:r="http://schemas.openxmlformats.org/officeDocument/2006/relationships" xmlns:p="http://schemas.openxmlformats.org/presentationml/2006/main">
+  <p:cSld>
+    <p:spTree>
+      <p:nvGrpSpPr>
+        <p:cNvPr id="1" name=""/>
+        <p:cNvGrpSpPr/>
+        <p:nvPr/>
+      </p:nvGrpSpPr>
+      <p:grpSpPr>
+        <a:xfrm>
+          <a:off x="0" y="0"/>
+          <a:ext cx="0" cy="0"/>
+          <a:chOff x="0" y="0"/>
+          <a:chExt cx="0" cy="0"/>
+        </a:xfrm>
+      </p:grpSpPr>
+      <p:sp>
+        <p:nvSpPr>
+          <p:cNvPr id="2" name="Title 1">
+            <a:extLst>
+              <a:ext uri="{FF2B5EF4-FFF2-40B4-BE49-F238E27FC236}">
+                <a16:creationId xmlns:a16="http://schemas.microsoft.com/office/drawing/2014/main" id="{470712FF-A879-9BFB-204A-791B7BDA9B72}"/>
+              </a:ext>
+            </a:extLst>
+          </p:cNvPr>
+          <p:cNvSpPr>
+            <a:spLocks noGrp="1"/>
+          </p:cNvSpPr>
+          <p:nvPr>
+            <p:ph type="title"/>
+          </p:nvPr>
+        </p:nvSpPr>
+        <p:spPr/>
+        <p:txBody>
+          <a:bodyPr/>
+          <a:lstStyle/>
+          <a:p>
+            <a:r>
+              <a:rPr lang="en-US" dirty="0"/>
+              <a:t>Login with session tokens.</a:t>
+            </a:r>
+            <a:endParaRPr lang="en-IN" dirty="0"/>
+          </a:p>
+        </p:txBody>
+      </p:sp>
+      <p:sp>
+        <p:nvSpPr>
+          <p:cNvPr id="3" name="Content Placeholder 2">
+            <a:extLst>
+              <a:ext uri="{FF2B5EF4-FFF2-40B4-BE49-F238E27FC236}">
+                <a16:creationId xmlns:a16="http://schemas.microsoft.com/office/drawing/2014/main" id="{71325349-4A26-6F6F-1A53-7A24A592CDFE}"/>
+              </a:ext>
+            </a:extLst>
+          </p:cNvPr>
+          <p:cNvSpPr>
+            <a:spLocks noGrp="1"/>
+          </p:cNvSpPr>
+          <p:nvPr>
+            <p:ph idx="1"/>
+          </p:nvPr>
+        </p:nvSpPr>
+        <p:spPr/>
+        <p:txBody>
+          <a:bodyPr/>
+          <a:lstStyle/>
+          <a:p>
+            <a:endParaRPr lang="en-IN"/>
+          </a:p>
+        </p:txBody>
+      </p:sp>
+    </p:spTree>
+    <p:extLst>
+      <p:ext uri="{BB962C8B-B14F-4D97-AF65-F5344CB8AC3E}">
+        <p14:creationId xmlns:p14="http://schemas.microsoft.com/office/powerpoint/2010/main" val="2292661749"/>
+      </p:ext>
+    </p:extLst>
+  </p:cSld>
+  <p:clrMapOvr>
+    <a:masterClrMapping/>
+  </p:clrMapOvr>
+  <mc:AlternateContent xmlns:mc="http://schemas.openxmlformats.org/markup-compatibility/2006" xmlns:p14="http://schemas.microsoft.com/office/powerpoint/2010/main">
+    <mc:Choice Requires="p14">
+      <p:transition spd="med" p14:dur="700">
+        <p:fade/>
+      </p:transition>
+    </mc:Choice>
+    <mc:Fallback xmlns="">
+      <p:transition spd="med">
+        <p:fade/>
+      </p:transition>
+    </mc:Fallback>
+  </mc:AlternateContent>
+</p:sld>
+</file>
+
+<file path=ppt/slides/slide35.xml><?xml version="1.0" encoding="utf-8"?>
 <p:sld xmlns:a="http://schemas.openxmlformats.org/drawingml/2006/main" xmlns:r="http://schemas.openxmlformats.org/officeDocument/2006/relationships" xmlns:p="http://schemas.openxmlformats.org/presentationml/2006/main">
   <p:cSld>
     <p:spTree>
@@ -10800,7 +11738,7 @@
 </p:sld>
 </file>
 
-<file path=ppt/slides/slide33.xml><?xml version="1.0" encoding="utf-8"?>
+<file path=ppt/slides/slide36.xml><?xml version="1.0" encoding="utf-8"?>
 <p:sld xmlns:a="http://schemas.openxmlformats.org/drawingml/2006/main" xmlns:r="http://schemas.openxmlformats.org/officeDocument/2006/relationships" xmlns:p="http://schemas.openxmlformats.org/presentationml/2006/main">
   <p:cSld>
     <p:spTree>
@@ -11157,7 +12095,7 @@
 </p:sld>
 </file>
 
-<file path=ppt/slides/slide34.xml><?xml version="1.0" encoding="utf-8"?>
+<file path=ppt/slides/slide37.xml><?xml version="1.0" encoding="utf-8"?>
 <p:sld xmlns:a="http://schemas.openxmlformats.org/drawingml/2006/main" xmlns:r="http://schemas.openxmlformats.org/officeDocument/2006/relationships" xmlns:p="http://schemas.openxmlformats.org/presentationml/2006/main">
   <p:cSld>
     <p:spTree>
@@ -11455,7 +12393,7 @@
 </p:sld>
 </file>
 
-<file path=ppt/slides/slide35.xml><?xml version="1.0" encoding="utf-8"?>
+<file path=ppt/slides/slide38.xml><?xml version="1.0" encoding="utf-8"?>
 <p:sld xmlns:a="http://schemas.openxmlformats.org/drawingml/2006/main" xmlns:r="http://schemas.openxmlformats.org/officeDocument/2006/relationships" xmlns:p="http://schemas.openxmlformats.org/presentationml/2006/main">
   <p:cSld>
     <p:spTree>
@@ -11767,7 +12705,7 @@
 </p:sld>
 </file>
 
-<file path=ppt/slides/slide36.xml><?xml version="1.0" encoding="utf-8"?>
+<file path=ppt/slides/slide39.xml><?xml version="1.0" encoding="utf-8"?>
 <p:sld xmlns:a="http://schemas.openxmlformats.org/drawingml/2006/main" xmlns:r="http://schemas.openxmlformats.org/officeDocument/2006/relationships" xmlns:p="http://schemas.openxmlformats.org/presentationml/2006/main">
   <p:cSld>
     <p:bg>
@@ -13099,7 +14037,197 @@
 </p:sld>
 </file>
 
-<file path=ppt/slides/slide37.xml><?xml version="1.0" encoding="utf-8"?>
+<file path=ppt/slides/slide4.xml><?xml version="1.0" encoding="utf-8"?>
+<p:sld xmlns:a="http://schemas.openxmlformats.org/drawingml/2006/main" xmlns:r="http://schemas.openxmlformats.org/officeDocument/2006/relationships" xmlns:p="http://schemas.openxmlformats.org/presentationml/2006/main">
+  <p:cSld>
+    <p:spTree>
+      <p:nvGrpSpPr>
+        <p:cNvPr id="1" name=""/>
+        <p:cNvGrpSpPr/>
+        <p:nvPr/>
+      </p:nvGrpSpPr>
+      <p:grpSpPr>
+        <a:xfrm>
+          <a:off x="0" y="0"/>
+          <a:ext cx="0" cy="0"/>
+          <a:chOff x="0" y="0"/>
+          <a:chExt cx="0" cy="0"/>
+        </a:xfrm>
+      </p:grpSpPr>
+      <p:sp>
+        <p:nvSpPr>
+          <p:cNvPr id="2" name="Title 1">
+            <a:extLst>
+              <a:ext uri="{FF2B5EF4-FFF2-40B4-BE49-F238E27FC236}">
+                <a16:creationId xmlns:a16="http://schemas.microsoft.com/office/drawing/2014/main" id="{72688CD5-5892-1093-731C-D2FBB7223DC2}"/>
+              </a:ext>
+            </a:extLst>
+          </p:cNvPr>
+          <p:cNvSpPr>
+            <a:spLocks noGrp="1"/>
+          </p:cNvSpPr>
+          <p:nvPr>
+            <p:ph type="title"/>
+          </p:nvPr>
+        </p:nvSpPr>
+        <p:spPr/>
+        <p:txBody>
+          <a:bodyPr/>
+          <a:lstStyle/>
+          <a:p>
+            <a:r>
+              <a:rPr lang="en-US" dirty="0"/>
+              <a:t>Problem statement</a:t>
+            </a:r>
+            <a:endParaRPr lang="en-IN" dirty="0"/>
+          </a:p>
+        </p:txBody>
+      </p:sp>
+      <p:sp>
+        <p:nvSpPr>
+          <p:cNvPr id="3" name="Content Placeholder 2">
+            <a:extLst>
+              <a:ext uri="{FF2B5EF4-FFF2-40B4-BE49-F238E27FC236}">
+                <a16:creationId xmlns:a16="http://schemas.microsoft.com/office/drawing/2014/main" id="{00CCF652-DACC-6FD7-DEF2-5F579B578C6F}"/>
+              </a:ext>
+            </a:extLst>
+          </p:cNvPr>
+          <p:cNvSpPr>
+            <a:spLocks noGrp="1"/>
+          </p:cNvSpPr>
+          <p:nvPr>
+            <p:ph idx="1"/>
+          </p:nvPr>
+        </p:nvSpPr>
+        <p:spPr>
+          <a:xfrm>
+            <a:off x="1069848" y="1855177"/>
+            <a:ext cx="10058400" cy="4317023"/>
+          </a:xfrm>
+        </p:spPr>
+        <p:txBody>
+          <a:bodyPr>
+            <a:normAutofit fontScale="85000" lnSpcReduction="10000"/>
+          </a:bodyPr>
+          <a:lstStyle/>
+          <a:p>
+            <a:pPr marL="0" indent="0">
+              <a:lnSpc>
+                <a:spcPct val="150000"/>
+              </a:lnSpc>
+              <a:buNone/>
+            </a:pPr>
+            <a:r>
+              <a:rPr lang="en-US" dirty="0"/>
+              <a:t>Problem Statement:   The manual process of managing inventory is becoming increasingly difficult and inefficient in today's fast-paced business environment. This leads to a number of challenges, including:</a:t>
+            </a:r>
+          </a:p>
+          <a:p>
+            <a:pPr lvl="1">
+              <a:lnSpc>
+                <a:spcPct val="150000"/>
+              </a:lnSpc>
+            </a:pPr>
+            <a:r>
+              <a:rPr lang="en-US" dirty="0"/>
+              <a:t>Inaccurate tracking of inventory levels</a:t>
+            </a:r>
+          </a:p>
+          <a:p>
+            <a:pPr lvl="1">
+              <a:lnSpc>
+                <a:spcPct val="150000"/>
+              </a:lnSpc>
+            </a:pPr>
+            <a:r>
+              <a:rPr lang="en-US" dirty="0"/>
+              <a:t>Increased costs due to overstocking or stock shortages</a:t>
+            </a:r>
+          </a:p>
+          <a:p>
+            <a:pPr lvl="1">
+              <a:lnSpc>
+                <a:spcPct val="150000"/>
+              </a:lnSpc>
+            </a:pPr>
+            <a:r>
+              <a:rPr lang="en-US" dirty="0"/>
+              <a:t>Poor customer satisfaction due to unavailability of products</a:t>
+            </a:r>
+          </a:p>
+          <a:p>
+            <a:pPr lvl="1">
+              <a:lnSpc>
+                <a:spcPct val="150000"/>
+              </a:lnSpc>
+            </a:pPr>
+            <a:r>
+              <a:rPr lang="en-US" dirty="0"/>
+              <a:t>Time-consuming manual processes</a:t>
+            </a:r>
+          </a:p>
+          <a:p>
+            <a:pPr lvl="1">
+              <a:lnSpc>
+                <a:spcPct val="150000"/>
+              </a:lnSpc>
+            </a:pPr>
+            <a:r>
+              <a:rPr lang="en-US" dirty="0"/>
+              <a:t>Inability to make informed decisions about inventory levels and reordering</a:t>
+            </a:r>
+          </a:p>
+          <a:p>
+            <a:pPr lvl="1">
+              <a:lnSpc>
+                <a:spcPct val="150000"/>
+              </a:lnSpc>
+            </a:pPr>
+            <a:r>
+              <a:rPr lang="en-US" dirty="0"/>
+              <a:t>Lack of real-time data on stock levels and demand patterns</a:t>
+            </a:r>
+          </a:p>
+          <a:p>
+            <a:pPr lvl="1">
+              <a:lnSpc>
+                <a:spcPct val="150000"/>
+              </a:lnSpc>
+            </a:pPr>
+            <a:r>
+              <a:rPr lang="en-US" dirty="0"/>
+              <a:t>These challenges highlight the need for a more efficient and automated solution for inventory management.</a:t>
+            </a:r>
+            <a:endParaRPr lang="en-IN" dirty="0"/>
+          </a:p>
+        </p:txBody>
+      </p:sp>
+    </p:spTree>
+    <p:extLst>
+      <p:ext uri="{BB962C8B-B14F-4D97-AF65-F5344CB8AC3E}">
+        <p14:creationId xmlns:p14="http://schemas.microsoft.com/office/powerpoint/2010/main" val="2940286370"/>
+      </p:ext>
+    </p:extLst>
+  </p:cSld>
+  <p:clrMapOvr>
+    <a:masterClrMapping/>
+  </p:clrMapOvr>
+  <mc:AlternateContent xmlns:mc="http://schemas.openxmlformats.org/markup-compatibility/2006" xmlns:p14="http://schemas.microsoft.com/office/powerpoint/2010/main">
+    <mc:Choice Requires="p14">
+      <p:transition spd="med" p14:dur="700">
+        <p:fade/>
+      </p:transition>
+    </mc:Choice>
+    <mc:Fallback xmlns="">
+      <p:transition spd="med">
+        <p:fade/>
+      </p:transition>
+    </mc:Fallback>
+  </mc:AlternateContent>
+</p:sld>
+</file>
+
+<file path=ppt/slides/slide40.xml><?xml version="1.0" encoding="utf-8"?>
 <p:sld xmlns:a="http://schemas.openxmlformats.org/drawingml/2006/main" xmlns:r="http://schemas.openxmlformats.org/officeDocument/2006/relationships" xmlns:p="http://schemas.openxmlformats.org/presentationml/2006/main">
   <p:cSld>
     <p:bg>
@@ -13745,7 +14873,7 @@
 </p:sld>
 </file>
 
-<file path=ppt/slides/slide38.xml><?xml version="1.0" encoding="utf-8"?>
+<file path=ppt/slides/slide41.xml><?xml version="1.0" encoding="utf-8"?>
 <p:sld xmlns:a="http://schemas.openxmlformats.org/drawingml/2006/main" xmlns:r="http://schemas.openxmlformats.org/officeDocument/2006/relationships" xmlns:p="http://schemas.openxmlformats.org/presentationml/2006/main">
   <p:cSld>
     <p:spTree>
@@ -13955,563 +15083,7 @@
 </p:sld>
 </file>
 
-<file path=ppt/slides/slide39.xml><?xml version="1.0" encoding="utf-8"?>
-<p:sld xmlns:a="http://schemas.openxmlformats.org/drawingml/2006/main" xmlns:r="http://schemas.openxmlformats.org/officeDocument/2006/relationships" xmlns:p="http://schemas.openxmlformats.org/presentationml/2006/main">
-  <p:cSld>
-    <p:spTree>
-      <p:nvGrpSpPr>
-        <p:cNvPr id="1" name=""/>
-        <p:cNvGrpSpPr/>
-        <p:nvPr/>
-      </p:nvGrpSpPr>
-      <p:grpSpPr>
-        <a:xfrm>
-          <a:off x="0" y="0"/>
-          <a:ext cx="0" cy="0"/>
-          <a:chOff x="0" y="0"/>
-          <a:chExt cx="0" cy="0"/>
-        </a:xfrm>
-      </p:grpSpPr>
-      <p:sp>
-        <p:nvSpPr>
-          <p:cNvPr id="2" name="Title 1">
-            <a:extLst>
-              <a:ext uri="{FF2B5EF4-FFF2-40B4-BE49-F238E27FC236}">
-                <a16:creationId xmlns:a16="http://schemas.microsoft.com/office/drawing/2014/main" id="{D4271991-FF89-444B-A4AE-F924423DE3A8}"/>
-              </a:ext>
-            </a:extLst>
-          </p:cNvPr>
-          <p:cNvSpPr>
-            <a:spLocks noGrp="1"/>
-          </p:cNvSpPr>
-          <p:nvPr>
-            <p:ph type="title"/>
-          </p:nvPr>
-        </p:nvSpPr>
-        <p:spPr>
-          <a:xfrm>
-            <a:off x="1069848" y="484632"/>
-            <a:ext cx="10058400" cy="781460"/>
-          </a:xfrm>
-        </p:spPr>
-        <p:txBody>
-          <a:bodyPr>
-            <a:normAutofit fontScale="90000"/>
-          </a:bodyPr>
-          <a:lstStyle/>
-          <a:p>
-            <a:r>
-              <a:rPr lang="en-US" dirty="0"/>
-              <a:t>Datasets</a:t>
-            </a:r>
-            <a:endParaRPr lang="en-IN" dirty="0"/>
-          </a:p>
-        </p:txBody>
-      </p:sp>
-      <p:sp>
-        <p:nvSpPr>
-          <p:cNvPr id="3" name="Content Placeholder 2">
-            <a:extLst>
-              <a:ext uri="{FF2B5EF4-FFF2-40B4-BE49-F238E27FC236}">
-                <a16:creationId xmlns:a16="http://schemas.microsoft.com/office/drawing/2014/main" id="{18B1C9AC-C79B-FB8D-2F3F-71FCA5BE3CA2}"/>
-              </a:ext>
-            </a:extLst>
-          </p:cNvPr>
-          <p:cNvSpPr>
-            <a:spLocks noGrp="1"/>
-          </p:cNvSpPr>
-          <p:nvPr>
-            <p:ph idx="1"/>
-          </p:nvPr>
-        </p:nvSpPr>
-        <p:spPr>
-          <a:xfrm>
-            <a:off x="1066800" y="1371600"/>
-            <a:ext cx="10058400" cy="4484077"/>
-          </a:xfrm>
-        </p:spPr>
-        <p:txBody>
-          <a:bodyPr/>
-          <a:lstStyle/>
-          <a:p>
-            <a:r>
-              <a:rPr lang="en-US" dirty="0">
-                <a:latin typeface="Bookman Old Style" panose="02050604050505020204" pitchFamily="18" charset="0"/>
-              </a:rPr>
-              <a:t>Sources:</a:t>
-            </a:r>
-          </a:p>
-          <a:p>
-            <a:pPr lvl="1">
-              <a:lnSpc>
-                <a:spcPct val="150000"/>
-              </a:lnSpc>
-            </a:pPr>
-            <a:r>
-              <a:rPr lang="en-US" b="1" i="0" dirty="0">
-                <a:solidFill>
-                  <a:srgbClr val="202124"/>
-                </a:solidFill>
-                <a:effectLst/>
-                <a:latin typeface="Bookman Old Style" panose="02050604050505020204" pitchFamily="18" charset="0"/>
-              </a:rPr>
-              <a:t>DATASET - Images of mechanical parts (Bolt, Nut, Washer, Pin) </a:t>
-            </a:r>
-            <a:r>
-              <a:rPr lang="en-US" sz="1400" dirty="0">
-                <a:latin typeface="Bookman Old Style" panose="02050604050505020204" pitchFamily="18" charset="0"/>
-                <a:hlinkClick r:id="rId2"/>
-              </a:rPr>
-              <a:t>https://www.kaggle.com/datasets/manikantanrnair/images-of-mechanical-parts-boltnut-washerpin</a:t>
-            </a:r>
-            <a:r>
-              <a:rPr lang="en-US" sz="1400" dirty="0">
-                <a:latin typeface="Bookman Old Style" panose="02050604050505020204" pitchFamily="18" charset="0"/>
-              </a:rPr>
-              <a:t> </a:t>
-            </a:r>
-          </a:p>
-          <a:p>
-            <a:pPr marL="274320" lvl="1" indent="0">
-              <a:buNone/>
-            </a:pPr>
-            <a:endParaRPr lang="en-US" b="1" dirty="0"/>
-          </a:p>
-        </p:txBody>
-      </p:sp>
-      <p:pic>
-        <p:nvPicPr>
-          <p:cNvPr id="6" name="Picture 5">
-            <a:extLst>
-              <a:ext uri="{FF2B5EF4-FFF2-40B4-BE49-F238E27FC236}">
-                <a16:creationId xmlns:a16="http://schemas.microsoft.com/office/drawing/2014/main" id="{1C4A4CB5-6A1F-C2D1-8D5C-2F4628CAB704}"/>
-              </a:ext>
-            </a:extLst>
-          </p:cNvPr>
-          <p:cNvPicPr>
-            <a:picLocks noChangeAspect="1"/>
-          </p:cNvPicPr>
-          <p:nvPr/>
-        </p:nvPicPr>
-        <p:blipFill rotWithShape="1">
-          <a:blip r:embed="rId3"/>
-          <a:srcRect l="9559" t="16340" r="2647" b="1438"/>
-          <a:stretch/>
-        </p:blipFill>
-        <p:spPr>
-          <a:xfrm>
-            <a:off x="932331" y="2987690"/>
-            <a:ext cx="2841884" cy="1497106"/>
-          </a:xfrm>
-          <a:prstGeom prst="rect">
-            <a:avLst/>
-          </a:prstGeom>
-        </p:spPr>
-      </p:pic>
-      <p:sp>
-        <p:nvSpPr>
-          <p:cNvPr id="7" name="TextBox 6">
-            <a:extLst>
-              <a:ext uri="{FF2B5EF4-FFF2-40B4-BE49-F238E27FC236}">
-                <a16:creationId xmlns:a16="http://schemas.microsoft.com/office/drawing/2014/main" id="{1F8A0EBC-12A4-3F04-93E4-7C5810B80345}"/>
-              </a:ext>
-            </a:extLst>
-          </p:cNvPr>
-          <p:cNvSpPr txBox="1"/>
-          <p:nvPr/>
-        </p:nvSpPr>
-        <p:spPr>
-          <a:xfrm>
-            <a:off x="2008094" y="4616238"/>
-            <a:ext cx="1335741" cy="369332"/>
-          </a:xfrm>
-          <a:prstGeom prst="rect">
-            <a:avLst/>
-          </a:prstGeom>
-          <a:noFill/>
-        </p:spPr>
-        <p:txBody>
-          <a:bodyPr wrap="square" rtlCol="0">
-            <a:spAutoFit/>
-          </a:bodyPr>
-          <a:lstStyle/>
-          <a:p>
-            <a:r>
-              <a:rPr lang="en-US" dirty="0"/>
-              <a:t>Bolts</a:t>
-            </a:r>
-            <a:endParaRPr lang="en-IN" dirty="0"/>
-          </a:p>
-        </p:txBody>
-      </p:sp>
-      <p:pic>
-        <p:nvPicPr>
-          <p:cNvPr id="9" name="Picture 8">
-            <a:extLst>
-              <a:ext uri="{FF2B5EF4-FFF2-40B4-BE49-F238E27FC236}">
-                <a16:creationId xmlns:a16="http://schemas.microsoft.com/office/drawing/2014/main" id="{0136141D-22B4-43B1-8490-119561AAEA0E}"/>
-              </a:ext>
-            </a:extLst>
-          </p:cNvPr>
-          <p:cNvPicPr>
-            <a:picLocks noChangeAspect="1"/>
-          </p:cNvPicPr>
-          <p:nvPr/>
-        </p:nvPicPr>
-        <p:blipFill rotWithShape="1">
-          <a:blip r:embed="rId4"/>
-          <a:srcRect l="9706" t="15949" r="2573" b="1568"/>
-          <a:stretch/>
-        </p:blipFill>
-        <p:spPr>
-          <a:xfrm>
-            <a:off x="4338916" y="3012141"/>
-            <a:ext cx="2830503" cy="1497106"/>
-          </a:xfrm>
-          <a:prstGeom prst="rect">
-            <a:avLst/>
-          </a:prstGeom>
-        </p:spPr>
-      </p:pic>
-      <p:sp>
-        <p:nvSpPr>
-          <p:cNvPr id="10" name="TextBox 9">
-            <a:extLst>
-              <a:ext uri="{FF2B5EF4-FFF2-40B4-BE49-F238E27FC236}">
-                <a16:creationId xmlns:a16="http://schemas.microsoft.com/office/drawing/2014/main" id="{B7650581-4B9A-C3CB-52D2-636683B22540}"/>
-              </a:ext>
-            </a:extLst>
-          </p:cNvPr>
-          <p:cNvSpPr txBox="1"/>
-          <p:nvPr/>
-        </p:nvSpPr>
-        <p:spPr>
-          <a:xfrm>
-            <a:off x="5134431" y="4628464"/>
-            <a:ext cx="1335741" cy="369332"/>
-          </a:xfrm>
-          <a:prstGeom prst="rect">
-            <a:avLst/>
-          </a:prstGeom>
-          <a:noFill/>
-        </p:spPr>
-        <p:txBody>
-          <a:bodyPr wrap="square" rtlCol="0">
-            <a:spAutoFit/>
-          </a:bodyPr>
-          <a:lstStyle/>
-          <a:p>
-            <a:r>
-              <a:rPr lang="en-US" dirty="0"/>
-              <a:t>Washer</a:t>
-            </a:r>
-            <a:endParaRPr lang="en-IN" dirty="0"/>
-          </a:p>
-        </p:txBody>
-      </p:sp>
-      <p:pic>
-        <p:nvPicPr>
-          <p:cNvPr id="12" name="Picture 11">
-            <a:extLst>
-              <a:ext uri="{FF2B5EF4-FFF2-40B4-BE49-F238E27FC236}">
-                <a16:creationId xmlns:a16="http://schemas.microsoft.com/office/drawing/2014/main" id="{3A7EDFC0-4525-1DE3-8779-4706DF83F5DA}"/>
-              </a:ext>
-            </a:extLst>
-          </p:cNvPr>
-          <p:cNvPicPr>
-            <a:picLocks noChangeAspect="1"/>
-          </p:cNvPicPr>
-          <p:nvPr/>
-        </p:nvPicPr>
-        <p:blipFill rotWithShape="1">
-          <a:blip r:embed="rId5"/>
-          <a:srcRect l="9779" t="18462" r="2207" b="1568"/>
-          <a:stretch/>
-        </p:blipFill>
-        <p:spPr>
-          <a:xfrm>
-            <a:off x="7937489" y="2987690"/>
-            <a:ext cx="3003933" cy="1535266"/>
-          </a:xfrm>
-          <a:prstGeom prst="rect">
-            <a:avLst/>
-          </a:prstGeom>
-        </p:spPr>
-      </p:pic>
-      <p:sp>
-        <p:nvSpPr>
-          <p:cNvPr id="13" name="TextBox 12">
-            <a:extLst>
-              <a:ext uri="{FF2B5EF4-FFF2-40B4-BE49-F238E27FC236}">
-                <a16:creationId xmlns:a16="http://schemas.microsoft.com/office/drawing/2014/main" id="{8115098A-45B1-914D-0098-5EF0E87729E6}"/>
-              </a:ext>
-            </a:extLst>
-          </p:cNvPr>
-          <p:cNvSpPr txBox="1"/>
-          <p:nvPr/>
-        </p:nvSpPr>
-        <p:spPr>
-          <a:xfrm>
-            <a:off x="9107762" y="4622175"/>
-            <a:ext cx="1335741" cy="369332"/>
-          </a:xfrm>
-          <a:prstGeom prst="rect">
-            <a:avLst/>
-          </a:prstGeom>
-          <a:noFill/>
-        </p:spPr>
-        <p:txBody>
-          <a:bodyPr wrap="square" rtlCol="0">
-            <a:spAutoFit/>
-          </a:bodyPr>
-          <a:lstStyle/>
-          <a:p>
-            <a:r>
-              <a:rPr lang="en-US" dirty="0"/>
-              <a:t>Nuts</a:t>
-            </a:r>
-            <a:endParaRPr lang="en-IN" dirty="0"/>
-          </a:p>
-        </p:txBody>
-      </p:sp>
-      <p:pic>
-        <p:nvPicPr>
-          <p:cNvPr id="15" name="Picture 14">
-            <a:extLst>
-              <a:ext uri="{FF2B5EF4-FFF2-40B4-BE49-F238E27FC236}">
-                <a16:creationId xmlns:a16="http://schemas.microsoft.com/office/drawing/2014/main" id="{8413B6EF-9FAA-876A-61BC-06C2CDF4947B}"/>
-              </a:ext>
-            </a:extLst>
-          </p:cNvPr>
-          <p:cNvPicPr>
-            <a:picLocks noChangeAspect="1"/>
-          </p:cNvPicPr>
-          <p:nvPr/>
-        </p:nvPicPr>
-        <p:blipFill rotWithShape="1">
-          <a:blip r:embed="rId6"/>
-          <a:srcRect l="10367" t="18462" r="3309" b="1961"/>
-          <a:stretch/>
-        </p:blipFill>
-        <p:spPr>
-          <a:xfrm>
-            <a:off x="2268071" y="5200226"/>
-            <a:ext cx="2528047" cy="1310901"/>
-          </a:xfrm>
-          <a:prstGeom prst="rect">
-            <a:avLst/>
-          </a:prstGeom>
-        </p:spPr>
-      </p:pic>
-      <p:sp>
-        <p:nvSpPr>
-          <p:cNvPr id="16" name="TextBox 15">
-            <a:extLst>
-              <a:ext uri="{FF2B5EF4-FFF2-40B4-BE49-F238E27FC236}">
-                <a16:creationId xmlns:a16="http://schemas.microsoft.com/office/drawing/2014/main" id="{01EC4948-8C22-230C-CF91-472F18695CF3}"/>
-              </a:ext>
-            </a:extLst>
-          </p:cNvPr>
-          <p:cNvSpPr txBox="1"/>
-          <p:nvPr/>
-        </p:nvSpPr>
-        <p:spPr>
-          <a:xfrm>
-            <a:off x="5134431" y="5756523"/>
-            <a:ext cx="1821424" cy="369332"/>
-          </a:xfrm>
-          <a:prstGeom prst="rect">
-            <a:avLst/>
-          </a:prstGeom>
-          <a:noFill/>
-        </p:spPr>
-        <p:txBody>
-          <a:bodyPr wrap="square" rtlCol="0">
-            <a:spAutoFit/>
-          </a:bodyPr>
-          <a:lstStyle/>
-          <a:p>
-            <a:r>
-              <a:rPr lang="en-US" dirty="0"/>
-              <a:t>Locating Pin</a:t>
-            </a:r>
-            <a:endParaRPr lang="en-IN" dirty="0"/>
-          </a:p>
-        </p:txBody>
-      </p:sp>
-    </p:spTree>
-    <p:extLst>
-      <p:ext uri="{BB962C8B-B14F-4D97-AF65-F5344CB8AC3E}">
-        <p14:creationId xmlns:p14="http://schemas.microsoft.com/office/powerpoint/2010/main" val="667155574"/>
-      </p:ext>
-    </p:extLst>
-  </p:cSld>
-  <p:clrMapOvr>
-    <a:masterClrMapping/>
-  </p:clrMapOvr>
-  <mc:AlternateContent xmlns:mc="http://schemas.openxmlformats.org/markup-compatibility/2006" xmlns:p14="http://schemas.microsoft.com/office/powerpoint/2010/main">
-    <mc:Choice Requires="p14">
-      <p:transition spd="med" p14:dur="700">
-        <p:fade/>
-      </p:transition>
-    </mc:Choice>
-    <mc:Fallback xmlns="">
-      <p:transition spd="med">
-        <p:fade/>
-      </p:transition>
-    </mc:Fallback>
-  </mc:AlternateContent>
-</p:sld>
-</file>
-
-<file path=ppt/slides/slide4.xml><?xml version="1.0" encoding="utf-8"?>
-<p:sld xmlns:a="http://schemas.openxmlformats.org/drawingml/2006/main" xmlns:r="http://schemas.openxmlformats.org/officeDocument/2006/relationships" xmlns:p="http://schemas.openxmlformats.org/presentationml/2006/main">
-  <p:cSld>
-    <p:spTree>
-      <p:nvGrpSpPr>
-        <p:cNvPr id="1" name=""/>
-        <p:cNvGrpSpPr/>
-        <p:nvPr/>
-      </p:nvGrpSpPr>
-      <p:grpSpPr>
-        <a:xfrm>
-          <a:off x="0" y="0"/>
-          <a:ext cx="0" cy="0"/>
-          <a:chOff x="0" y="0"/>
-          <a:chExt cx="0" cy="0"/>
-        </a:xfrm>
-      </p:grpSpPr>
-      <p:sp>
-        <p:nvSpPr>
-          <p:cNvPr id="2" name="Title 1">
-            <a:extLst>
-              <a:ext uri="{FF2B5EF4-FFF2-40B4-BE49-F238E27FC236}">
-                <a16:creationId xmlns:a16="http://schemas.microsoft.com/office/drawing/2014/main" id="{72688CD5-5892-1093-731C-D2FBB7223DC2}"/>
-              </a:ext>
-            </a:extLst>
-          </p:cNvPr>
-          <p:cNvSpPr>
-            <a:spLocks noGrp="1"/>
-          </p:cNvSpPr>
-          <p:nvPr>
-            <p:ph type="title"/>
-          </p:nvPr>
-        </p:nvSpPr>
-        <p:spPr/>
-        <p:txBody>
-          <a:bodyPr/>
-          <a:lstStyle/>
-          <a:p>
-            <a:r>
-              <a:rPr lang="en-US" dirty="0"/>
-              <a:t>Problem statement</a:t>
-            </a:r>
-            <a:endParaRPr lang="en-IN" dirty="0"/>
-          </a:p>
-        </p:txBody>
-      </p:sp>
-      <p:sp>
-        <p:nvSpPr>
-          <p:cNvPr id="3" name="Content Placeholder 2">
-            <a:extLst>
-              <a:ext uri="{FF2B5EF4-FFF2-40B4-BE49-F238E27FC236}">
-                <a16:creationId xmlns:a16="http://schemas.microsoft.com/office/drawing/2014/main" id="{00CCF652-DACC-6FD7-DEF2-5F579B578C6F}"/>
-              </a:ext>
-            </a:extLst>
-          </p:cNvPr>
-          <p:cNvSpPr>
-            <a:spLocks noGrp="1"/>
-          </p:cNvSpPr>
-          <p:nvPr>
-            <p:ph idx="1"/>
-          </p:nvPr>
-        </p:nvSpPr>
-        <p:spPr/>
-        <p:txBody>
-          <a:bodyPr>
-            <a:normAutofit fontScale="92500" lnSpcReduction="20000"/>
-          </a:bodyPr>
-          <a:lstStyle/>
-          <a:p>
-            <a:r>
-              <a:rPr lang="en-US" dirty="0"/>
-              <a:t>Problem Statement:   The manual process of managing inventory is becoming increasingly difficult and inefficient in today's fast-paced business environment. This leads to a number of challenges, including:</a:t>
-            </a:r>
-          </a:p>
-          <a:p>
-            <a:endParaRPr lang="en-US" dirty="0"/>
-          </a:p>
-          <a:p>
-            <a:r>
-              <a:rPr lang="en-US" dirty="0"/>
-              <a:t>Inaccurate tracking of inventory levels</a:t>
-            </a:r>
-          </a:p>
-          <a:p>
-            <a:r>
-              <a:rPr lang="en-US" dirty="0"/>
-              <a:t>Increased costs due to overstocking or stock shortages</a:t>
-            </a:r>
-          </a:p>
-          <a:p>
-            <a:r>
-              <a:rPr lang="en-US" dirty="0"/>
-              <a:t>Poor customer satisfaction due to unavailability of products</a:t>
-            </a:r>
-          </a:p>
-          <a:p>
-            <a:r>
-              <a:rPr lang="en-US" dirty="0"/>
-              <a:t>Time-consuming manual processes</a:t>
-            </a:r>
-          </a:p>
-          <a:p>
-            <a:r>
-              <a:rPr lang="en-US" dirty="0"/>
-              <a:t>Inability to make informed decisions about inventory levels and reordering</a:t>
-            </a:r>
-          </a:p>
-          <a:p>
-            <a:r>
-              <a:rPr lang="en-US" dirty="0"/>
-              <a:t>Lack of real-time data on stock levels and demand patterns</a:t>
-            </a:r>
-          </a:p>
-          <a:p>
-            <a:r>
-              <a:rPr lang="en-US" dirty="0"/>
-              <a:t>These challenges highlight the need for a more efficient and automated solution for inventory management.</a:t>
-            </a:r>
-            <a:endParaRPr lang="en-IN" dirty="0"/>
-          </a:p>
-        </p:txBody>
-      </p:sp>
-    </p:spTree>
-    <p:extLst>
-      <p:ext uri="{BB962C8B-B14F-4D97-AF65-F5344CB8AC3E}">
-        <p14:creationId xmlns:p14="http://schemas.microsoft.com/office/powerpoint/2010/main" val="2940286370"/>
-      </p:ext>
-    </p:extLst>
-  </p:cSld>
-  <p:clrMapOvr>
-    <a:masterClrMapping/>
-  </p:clrMapOvr>
-  <mc:AlternateContent xmlns:mc="http://schemas.openxmlformats.org/markup-compatibility/2006" xmlns:p14="http://schemas.microsoft.com/office/powerpoint/2010/main">
-    <mc:Choice Requires="p14">
-      <p:transition spd="med" p14:dur="700">
-        <p:fade/>
-      </p:transition>
-    </mc:Choice>
-    <mc:Fallback xmlns="">
-      <p:transition spd="med">
-        <p:fade/>
-      </p:transition>
-    </mc:Fallback>
-  </mc:AlternateContent>
-</p:sld>
-</file>
-
-<file path=ppt/slides/slide40.xml><?xml version="1.0" encoding="utf-8"?>
+<file path=ppt/slides/slide42.xml><?xml version="1.0" encoding="utf-8"?>
 <p:sld xmlns:a="http://schemas.openxmlformats.org/drawingml/2006/main" xmlns:r="http://schemas.openxmlformats.org/officeDocument/2006/relationships" xmlns:p="http://schemas.openxmlformats.org/presentationml/2006/main">
   <p:cSld>
     <p:spTree>
@@ -14701,7 +15273,7 @@
 </p:sld>
 </file>
 
-<file path=ppt/slides/slide41.xml><?xml version="1.0" encoding="utf-8"?>
+<file path=ppt/slides/slide43.xml><?xml version="1.0" encoding="utf-8"?>
 <p:sld xmlns:a="http://schemas.openxmlformats.org/drawingml/2006/main" xmlns:r="http://schemas.openxmlformats.org/officeDocument/2006/relationships" xmlns:p="http://schemas.openxmlformats.org/presentationml/2006/main">
   <p:cSld>
     <p:spTree>
@@ -18126,7 +18698,7 @@
 </p:sld>
 </file>
 
-<file path=ppt/slides/slide42.xml><?xml version="1.0" encoding="utf-8"?>
+<file path=ppt/slides/slide44.xml><?xml version="1.0" encoding="utf-8"?>
 <p:sld xmlns:a="http://schemas.openxmlformats.org/drawingml/2006/main" xmlns:r="http://schemas.openxmlformats.org/officeDocument/2006/relationships" xmlns:p="http://schemas.openxmlformats.org/presentationml/2006/main">
   <p:cSld>
     <p:spTree>
@@ -18469,7 +19041,7 @@
 </p:sld>
 </file>
 
-<file path=ppt/slides/slide43.xml><?xml version="1.0" encoding="utf-8"?>
+<file path=ppt/slides/slide45.xml><?xml version="1.0" encoding="utf-8"?>
 <p:sld xmlns:a="http://schemas.openxmlformats.org/drawingml/2006/main" xmlns:r="http://schemas.openxmlformats.org/officeDocument/2006/relationships" xmlns:p="http://schemas.openxmlformats.org/presentationml/2006/main">
   <p:cSld>
     <p:spTree>

</xml_diff>

<commit_message>
Add image classification info in report //algorthim is remaining
</commit_message>
<xml_diff>
--- a/ProjectReview-2 (1).pptx
+++ b/ProjectReview-2 (1).pptx
@@ -239,7 +239,7 @@
           <a:p>
             <a:fld id="{E2C6AAEB-6988-43D2-9654-EC3C0BFABB9D}" type="datetimeFigureOut">
               <a:rPr lang="en-IN" smtClean="0"/>
-              <a:t>31-01-2023</a:t>
+              <a:t>01-02-2023</a:t>
             </a:fld>
             <a:endParaRPr lang="en-IN"/>
           </a:p>
@@ -910,7 +910,7 @@
           <a:p>
             <a:fld id="{0D3A107C-E2A5-4917-B22D-A9F2DBD463CC}" type="datetimeFigureOut">
               <a:rPr lang="en-IN" smtClean="0"/>
-              <a:t>31-01-2023</a:t>
+              <a:t>01-02-2023</a:t>
             </a:fld>
             <a:endParaRPr lang="en-IN"/>
           </a:p>
@@ -1101,7 +1101,7 @@
           <a:p>
             <a:fld id="{0D3A107C-E2A5-4917-B22D-A9F2DBD463CC}" type="datetimeFigureOut">
               <a:rPr lang="en-IN" smtClean="0"/>
-              <a:t>31-01-2023</a:t>
+              <a:t>01-02-2023</a:t>
             </a:fld>
             <a:endParaRPr lang="en-IN"/>
           </a:p>
@@ -1293,7 +1293,7 @@
           <a:p>
             <a:fld id="{0D3A107C-E2A5-4917-B22D-A9F2DBD463CC}" type="datetimeFigureOut">
               <a:rPr lang="en-IN" smtClean="0"/>
-              <a:t>31-01-2023</a:t>
+              <a:t>01-02-2023</a:t>
             </a:fld>
             <a:endParaRPr lang="en-IN"/>
           </a:p>
@@ -1475,7 +1475,7 @@
           <a:p>
             <a:fld id="{0D3A107C-E2A5-4917-B22D-A9F2DBD463CC}" type="datetimeFigureOut">
               <a:rPr lang="en-IN" smtClean="0"/>
-              <a:t>31-01-2023</a:t>
+              <a:t>01-02-2023</a:t>
             </a:fld>
             <a:endParaRPr lang="en-IN"/>
           </a:p>
@@ -1800,7 +1800,7 @@
           <a:p>
             <a:fld id="{0D3A107C-E2A5-4917-B22D-A9F2DBD463CC}" type="datetimeFigureOut">
               <a:rPr lang="en-IN" smtClean="0"/>
-              <a:t>31-01-2023</a:t>
+              <a:t>01-02-2023</a:t>
             </a:fld>
             <a:endParaRPr lang="en-IN"/>
           </a:p>
@@ -2198,7 +2198,7 @@
           <a:p>
             <a:fld id="{0D3A107C-E2A5-4917-B22D-A9F2DBD463CC}" type="datetimeFigureOut">
               <a:rPr lang="en-IN" smtClean="0"/>
-              <a:t>31-01-2023</a:t>
+              <a:t>01-02-2023</a:t>
             </a:fld>
             <a:endParaRPr lang="en-IN"/>
           </a:p>
@@ -2644,7 +2644,7 @@
           <a:p>
             <a:fld id="{0D3A107C-E2A5-4917-B22D-A9F2DBD463CC}" type="datetimeFigureOut">
               <a:rPr lang="en-IN" smtClean="0"/>
-              <a:t>31-01-2023</a:t>
+              <a:t>01-02-2023</a:t>
             </a:fld>
             <a:endParaRPr lang="en-IN"/>
           </a:p>
@@ -2774,7 +2774,7 @@
           <a:p>
             <a:fld id="{0D3A107C-E2A5-4917-B22D-A9F2DBD463CC}" type="datetimeFigureOut">
               <a:rPr lang="en-IN" smtClean="0"/>
-              <a:t>31-01-2023</a:t>
+              <a:t>01-02-2023</a:t>
             </a:fld>
             <a:endParaRPr lang="en-IN"/>
           </a:p>
@@ -2881,7 +2881,7 @@
           <a:p>
             <a:fld id="{0D3A107C-E2A5-4917-B22D-A9F2DBD463CC}" type="datetimeFigureOut">
               <a:rPr lang="en-IN" smtClean="0"/>
-              <a:t>31-01-2023</a:t>
+              <a:t>01-02-2023</a:t>
             </a:fld>
             <a:endParaRPr lang="en-IN"/>
           </a:p>
@@ -3243,7 +3243,7 @@
           <a:p>
             <a:fld id="{0D3A107C-E2A5-4917-B22D-A9F2DBD463CC}" type="datetimeFigureOut">
               <a:rPr lang="en-IN" smtClean="0"/>
-              <a:t>31-01-2023</a:t>
+              <a:t>01-02-2023</a:t>
             </a:fld>
             <a:endParaRPr lang="en-IN"/>
           </a:p>
@@ -3680,7 +3680,7 @@
           <a:p>
             <a:fld id="{0D3A107C-E2A5-4917-B22D-A9F2DBD463CC}" type="datetimeFigureOut">
               <a:rPr lang="en-IN" smtClean="0"/>
-              <a:t>31-01-2023</a:t>
+              <a:t>01-02-2023</a:t>
             </a:fld>
             <a:endParaRPr lang="en-IN"/>
           </a:p>
@@ -3973,7 +3973,7 @@
           <a:p>
             <a:fld id="{0D3A107C-E2A5-4917-B22D-A9F2DBD463CC}" type="datetimeFigureOut">
               <a:rPr lang="en-IN" smtClean="0"/>
-              <a:t>31-01-2023</a:t>
+              <a:t>01-02-2023</a:t>
             </a:fld>
             <a:endParaRPr lang="en-IN"/>
           </a:p>
@@ -5271,13 +5271,13 @@
   <p:clrMapOvr>
     <a:masterClrMapping/>
   </p:clrMapOvr>
-  <mc:AlternateContent xmlns:mc="http://schemas.openxmlformats.org/markup-compatibility/2006">
-    <mc:Choice xmlns:p14="http://schemas.microsoft.com/office/powerpoint/2010/main" Requires="p14">
+  <mc:AlternateContent xmlns:mc="http://schemas.openxmlformats.org/markup-compatibility/2006" xmlns:p14="http://schemas.microsoft.com/office/powerpoint/2010/main">
+    <mc:Choice Requires="p14">
       <p:transition spd="med" p14:dur="700">
         <p:fade/>
       </p:transition>
     </mc:Choice>
-    <mc:Fallback>
+    <mc:Fallback xmlns="">
       <p:transition spd="med">
         <p:fade/>
       </p:transition>
@@ -12145,7 +12145,7 @@
         </p:blipFill>
         <p:spPr>
           <a:xfrm>
-            <a:off x="1007196" y="2265037"/>
+            <a:off x="1007196" y="2273829"/>
             <a:ext cx="5088800" cy="3907158"/>
           </a:xfrm>
           <a:prstGeom prst="rect">

</xml_diff>